<commit_message>
Add new images to presentation
</commit_message>
<xml_diff>
--- a/ConnBlockchains/images/BlockchainImages.pptx
+++ b/ConnBlockchains/images/BlockchainImages.pptx
@@ -8,6 +8,10 @@
     <p:sldId id="261" r:id="rId2"/>
     <p:sldId id="262" r:id="rId3"/>
     <p:sldId id="263" r:id="rId4"/>
+    <p:sldId id="264" r:id="rId5"/>
+    <p:sldId id="267" r:id="rId6"/>
+    <p:sldId id="265" r:id="rId7"/>
+    <p:sldId id="266" r:id="rId8"/>
   </p:sldIdLst>
   <p:sldSz cx="12192000" cy="6858000"/>
   <p:notesSz cx="6858000" cy="9144000"/>
@@ -5098,6 +5102,2851 @@
 </p:sld>
 </file>
 
+<file path=ppt/slides/slide4.xml><?xml version="1.0" encoding="utf-8"?>
+<p:sld xmlns:a="http://schemas.openxmlformats.org/drawingml/2006/main" xmlns:r="http://schemas.openxmlformats.org/officeDocument/2006/relationships" xmlns:p="http://schemas.openxmlformats.org/presentationml/2006/main">
+  <p:cSld>
+    <p:spTree>
+      <p:nvGrpSpPr>
+        <p:cNvPr id="1" name=""/>
+        <p:cNvGrpSpPr/>
+        <p:nvPr/>
+      </p:nvGrpSpPr>
+      <p:grpSpPr>
+        <a:xfrm>
+          <a:off x="0" y="0"/>
+          <a:ext cx="0" cy="0"/>
+          <a:chOff x="0" y="0"/>
+          <a:chExt cx="0" cy="0"/>
+        </a:xfrm>
+      </p:grpSpPr>
+      <p:sp>
+        <p:nvSpPr>
+          <p:cNvPr id="2" name="Rectangle 1"/>
+          <p:cNvSpPr/>
+          <p:nvPr/>
+        </p:nvSpPr>
+        <p:spPr>
+          <a:xfrm>
+            <a:off x="768626" y="1524000"/>
+            <a:ext cx="2570922" cy="569843"/>
+          </a:xfrm>
+          <a:prstGeom prst="rect">
+            <a:avLst/>
+          </a:prstGeom>
+        </p:spPr>
+        <p:style>
+          <a:lnRef idx="2">
+            <a:schemeClr val="accent1">
+              <a:shade val="50000"/>
+            </a:schemeClr>
+          </a:lnRef>
+          <a:fillRef idx="1">
+            <a:schemeClr val="accent1"/>
+          </a:fillRef>
+          <a:effectRef idx="0">
+            <a:schemeClr val="accent1"/>
+          </a:effectRef>
+          <a:fontRef idx="minor">
+            <a:schemeClr val="lt1"/>
+          </a:fontRef>
+        </p:style>
+        <p:txBody>
+          <a:bodyPr rtlCol="0" anchor="ctr"/>
+          <a:lstStyle/>
+          <a:p>
+            <a:pPr algn="ctr"/>
+            <a:endParaRPr lang="es-ES"/>
+          </a:p>
+        </p:txBody>
+      </p:sp>
+      <p:sp>
+        <p:nvSpPr>
+          <p:cNvPr id="3" name="Rectangle 2"/>
+          <p:cNvSpPr/>
+          <p:nvPr/>
+        </p:nvSpPr>
+        <p:spPr>
+          <a:xfrm>
+            <a:off x="3339548" y="1524000"/>
+            <a:ext cx="974035" cy="569843"/>
+          </a:xfrm>
+          <a:prstGeom prst="rect">
+            <a:avLst/>
+          </a:prstGeom>
+          <a:solidFill>
+            <a:srgbClr val="00B0F0"/>
+          </a:solidFill>
+        </p:spPr>
+        <p:style>
+          <a:lnRef idx="2">
+            <a:schemeClr val="accent1">
+              <a:shade val="50000"/>
+            </a:schemeClr>
+          </a:lnRef>
+          <a:fillRef idx="1">
+            <a:schemeClr val="accent1"/>
+          </a:fillRef>
+          <a:effectRef idx="0">
+            <a:schemeClr val="accent1"/>
+          </a:effectRef>
+          <a:fontRef idx="minor">
+            <a:schemeClr val="lt1"/>
+          </a:fontRef>
+        </p:style>
+        <p:txBody>
+          <a:bodyPr rtlCol="0" anchor="ctr"/>
+          <a:lstStyle/>
+          <a:p>
+            <a:pPr algn="ctr"/>
+            <a:r>
+              <a:rPr lang="es-MX" dirty="0">
+                <a:solidFill>
+                  <a:schemeClr val="tx1"/>
+                </a:solidFill>
+              </a:rPr>
+              <a:t>0.05</a:t>
+            </a:r>
+            <a:endParaRPr lang="es-ES" dirty="0">
+              <a:solidFill>
+                <a:schemeClr val="tx1"/>
+              </a:solidFill>
+            </a:endParaRPr>
+          </a:p>
+        </p:txBody>
+      </p:sp>
+      <p:sp>
+        <p:nvSpPr>
+          <p:cNvPr id="4" name="Rectangle 3"/>
+          <p:cNvSpPr/>
+          <p:nvPr/>
+        </p:nvSpPr>
+        <p:spPr>
+          <a:xfrm>
+            <a:off x="768626" y="2093843"/>
+            <a:ext cx="2570922" cy="569843"/>
+          </a:xfrm>
+          <a:prstGeom prst="rect">
+            <a:avLst/>
+          </a:prstGeom>
+        </p:spPr>
+        <p:style>
+          <a:lnRef idx="2">
+            <a:schemeClr val="accent1">
+              <a:shade val="50000"/>
+            </a:schemeClr>
+          </a:lnRef>
+          <a:fillRef idx="1">
+            <a:schemeClr val="accent1"/>
+          </a:fillRef>
+          <a:effectRef idx="0">
+            <a:schemeClr val="accent1"/>
+          </a:effectRef>
+          <a:fontRef idx="minor">
+            <a:schemeClr val="lt1"/>
+          </a:fontRef>
+        </p:style>
+        <p:txBody>
+          <a:bodyPr rtlCol="0" anchor="ctr"/>
+          <a:lstStyle/>
+          <a:p>
+            <a:pPr algn="ctr"/>
+            <a:endParaRPr lang="es-ES"/>
+          </a:p>
+        </p:txBody>
+      </p:sp>
+      <p:sp>
+        <p:nvSpPr>
+          <p:cNvPr id="5" name="Rectangle 4"/>
+          <p:cNvSpPr/>
+          <p:nvPr/>
+        </p:nvSpPr>
+        <p:spPr>
+          <a:xfrm>
+            <a:off x="3339548" y="2093843"/>
+            <a:ext cx="974035" cy="569843"/>
+          </a:xfrm>
+          <a:prstGeom prst="rect">
+            <a:avLst/>
+          </a:prstGeom>
+          <a:solidFill>
+            <a:srgbClr val="00B0F0"/>
+          </a:solidFill>
+        </p:spPr>
+        <p:style>
+          <a:lnRef idx="2">
+            <a:schemeClr val="accent1">
+              <a:shade val="50000"/>
+            </a:schemeClr>
+          </a:lnRef>
+          <a:fillRef idx="1">
+            <a:schemeClr val="accent1"/>
+          </a:fillRef>
+          <a:effectRef idx="0">
+            <a:schemeClr val="accent1"/>
+          </a:effectRef>
+          <a:fontRef idx="minor">
+            <a:schemeClr val="lt1"/>
+          </a:fontRef>
+        </p:style>
+        <p:txBody>
+          <a:bodyPr rtlCol="0" anchor="ctr"/>
+          <a:lstStyle/>
+          <a:p>
+            <a:pPr algn="ctr"/>
+            <a:r>
+              <a:rPr lang="es-MX" dirty="0">
+                <a:solidFill>
+                  <a:schemeClr val="tx1"/>
+                </a:solidFill>
+              </a:rPr>
+              <a:t>0.15</a:t>
+            </a:r>
+            <a:endParaRPr lang="es-ES" dirty="0">
+              <a:solidFill>
+                <a:schemeClr val="tx1"/>
+              </a:solidFill>
+            </a:endParaRPr>
+          </a:p>
+        </p:txBody>
+      </p:sp>
+      <p:sp>
+        <p:nvSpPr>
+          <p:cNvPr id="6" name="Rectangle 5"/>
+          <p:cNvSpPr/>
+          <p:nvPr/>
+        </p:nvSpPr>
+        <p:spPr>
+          <a:xfrm>
+            <a:off x="768626" y="2663686"/>
+            <a:ext cx="2570922" cy="569843"/>
+          </a:xfrm>
+          <a:prstGeom prst="rect">
+            <a:avLst/>
+          </a:prstGeom>
+        </p:spPr>
+        <p:style>
+          <a:lnRef idx="2">
+            <a:schemeClr val="accent1">
+              <a:shade val="50000"/>
+            </a:schemeClr>
+          </a:lnRef>
+          <a:fillRef idx="1">
+            <a:schemeClr val="accent1"/>
+          </a:fillRef>
+          <a:effectRef idx="0">
+            <a:schemeClr val="accent1"/>
+          </a:effectRef>
+          <a:fontRef idx="minor">
+            <a:schemeClr val="lt1"/>
+          </a:fontRef>
+        </p:style>
+        <p:txBody>
+          <a:bodyPr rtlCol="0" anchor="ctr"/>
+          <a:lstStyle/>
+          <a:p>
+            <a:pPr algn="ctr"/>
+            <a:endParaRPr lang="es-ES"/>
+          </a:p>
+        </p:txBody>
+      </p:sp>
+      <p:sp>
+        <p:nvSpPr>
+          <p:cNvPr id="7" name="Rectangle 6"/>
+          <p:cNvSpPr/>
+          <p:nvPr/>
+        </p:nvSpPr>
+        <p:spPr>
+          <a:xfrm>
+            <a:off x="3339548" y="2663686"/>
+            <a:ext cx="974035" cy="569843"/>
+          </a:xfrm>
+          <a:prstGeom prst="rect">
+            <a:avLst/>
+          </a:prstGeom>
+          <a:solidFill>
+            <a:srgbClr val="00B0F0"/>
+          </a:solidFill>
+        </p:spPr>
+        <p:style>
+          <a:lnRef idx="2">
+            <a:schemeClr val="accent1">
+              <a:shade val="50000"/>
+            </a:schemeClr>
+          </a:lnRef>
+          <a:fillRef idx="1">
+            <a:schemeClr val="accent1"/>
+          </a:fillRef>
+          <a:effectRef idx="0">
+            <a:schemeClr val="accent1"/>
+          </a:effectRef>
+          <a:fontRef idx="minor">
+            <a:schemeClr val="lt1"/>
+          </a:fontRef>
+        </p:style>
+        <p:txBody>
+          <a:bodyPr rtlCol="0" anchor="ctr"/>
+          <a:lstStyle/>
+          <a:p>
+            <a:pPr algn="ctr"/>
+            <a:r>
+              <a:rPr lang="es-MX" dirty="0">
+                <a:solidFill>
+                  <a:schemeClr val="tx1"/>
+                </a:solidFill>
+              </a:rPr>
+              <a:t>0.25</a:t>
+            </a:r>
+            <a:endParaRPr lang="es-ES" dirty="0">
+              <a:solidFill>
+                <a:schemeClr val="tx1"/>
+              </a:solidFill>
+            </a:endParaRPr>
+          </a:p>
+        </p:txBody>
+      </p:sp>
+      <p:sp>
+        <p:nvSpPr>
+          <p:cNvPr id="8" name="TextBox 7"/>
+          <p:cNvSpPr txBox="1"/>
+          <p:nvPr/>
+        </p:nvSpPr>
+        <p:spPr>
+          <a:xfrm>
+            <a:off x="768626" y="1024092"/>
+            <a:ext cx="1103187" cy="523220"/>
+          </a:xfrm>
+          <a:prstGeom prst="rect">
+            <a:avLst/>
+          </a:prstGeom>
+          <a:noFill/>
+        </p:spPr>
+        <p:txBody>
+          <a:bodyPr wrap="none" rtlCol="0">
+            <a:spAutoFit/>
+          </a:bodyPr>
+          <a:lstStyle/>
+          <a:p>
+            <a:r>
+              <a:rPr lang="es-MX" sz="2800" dirty="0"/>
+              <a:t>Inputs</a:t>
+            </a:r>
+            <a:endParaRPr lang="es-ES" dirty="0"/>
+          </a:p>
+        </p:txBody>
+      </p:sp>
+      <p:sp>
+        <p:nvSpPr>
+          <p:cNvPr id="9" name="Rectangle 8"/>
+          <p:cNvSpPr/>
+          <p:nvPr/>
+        </p:nvSpPr>
+        <p:spPr>
+          <a:xfrm>
+            <a:off x="4856921" y="1524000"/>
+            <a:ext cx="2570922" cy="569843"/>
+          </a:xfrm>
+          <a:prstGeom prst="rect">
+            <a:avLst/>
+          </a:prstGeom>
+          <a:solidFill>
+            <a:schemeClr val="accent6"/>
+          </a:solidFill>
+        </p:spPr>
+        <p:style>
+          <a:lnRef idx="2">
+            <a:schemeClr val="accent1">
+              <a:shade val="50000"/>
+            </a:schemeClr>
+          </a:lnRef>
+          <a:fillRef idx="1">
+            <a:schemeClr val="accent1"/>
+          </a:fillRef>
+          <a:effectRef idx="0">
+            <a:schemeClr val="accent1"/>
+          </a:effectRef>
+          <a:fontRef idx="minor">
+            <a:schemeClr val="lt1"/>
+          </a:fontRef>
+        </p:style>
+        <p:txBody>
+          <a:bodyPr rtlCol="0" anchor="ctr"/>
+          <a:lstStyle/>
+          <a:p>
+            <a:pPr algn="ctr"/>
+            <a:endParaRPr lang="es-ES"/>
+          </a:p>
+        </p:txBody>
+      </p:sp>
+      <p:sp>
+        <p:nvSpPr>
+          <p:cNvPr id="10" name="Rectangle 9"/>
+          <p:cNvSpPr/>
+          <p:nvPr/>
+        </p:nvSpPr>
+        <p:spPr>
+          <a:xfrm>
+            <a:off x="7427843" y="1524000"/>
+            <a:ext cx="974035" cy="569843"/>
+          </a:xfrm>
+          <a:prstGeom prst="rect">
+            <a:avLst/>
+          </a:prstGeom>
+          <a:solidFill>
+            <a:schemeClr val="accent6">
+              <a:lumMod val="60000"/>
+              <a:lumOff val="40000"/>
+            </a:schemeClr>
+          </a:solidFill>
+        </p:spPr>
+        <p:style>
+          <a:lnRef idx="2">
+            <a:schemeClr val="accent1">
+              <a:shade val="50000"/>
+            </a:schemeClr>
+          </a:lnRef>
+          <a:fillRef idx="1">
+            <a:schemeClr val="accent1"/>
+          </a:fillRef>
+          <a:effectRef idx="0">
+            <a:schemeClr val="accent1"/>
+          </a:effectRef>
+          <a:fontRef idx="minor">
+            <a:schemeClr val="lt1"/>
+          </a:fontRef>
+        </p:style>
+        <p:txBody>
+          <a:bodyPr rtlCol="0" anchor="ctr"/>
+          <a:lstStyle/>
+          <a:p>
+            <a:pPr algn="ctr"/>
+            <a:r>
+              <a:rPr lang="es-MX" dirty="0">
+                <a:solidFill>
+                  <a:schemeClr val="tx1"/>
+                </a:solidFill>
+              </a:rPr>
+              <a:t>0.38</a:t>
+            </a:r>
+            <a:endParaRPr lang="es-ES" dirty="0">
+              <a:solidFill>
+                <a:schemeClr val="tx1"/>
+              </a:solidFill>
+            </a:endParaRPr>
+          </a:p>
+        </p:txBody>
+      </p:sp>
+      <p:sp>
+        <p:nvSpPr>
+          <p:cNvPr id="11" name="Rectangle 10"/>
+          <p:cNvSpPr/>
+          <p:nvPr/>
+        </p:nvSpPr>
+        <p:spPr>
+          <a:xfrm>
+            <a:off x="4850295" y="2100467"/>
+            <a:ext cx="2570922" cy="569843"/>
+          </a:xfrm>
+          <a:prstGeom prst="rect">
+            <a:avLst/>
+          </a:prstGeom>
+          <a:solidFill>
+            <a:schemeClr val="accent6"/>
+          </a:solidFill>
+        </p:spPr>
+        <p:style>
+          <a:lnRef idx="2">
+            <a:schemeClr val="accent1">
+              <a:shade val="50000"/>
+            </a:schemeClr>
+          </a:lnRef>
+          <a:fillRef idx="1">
+            <a:schemeClr val="accent1"/>
+          </a:fillRef>
+          <a:effectRef idx="0">
+            <a:schemeClr val="accent1"/>
+          </a:effectRef>
+          <a:fontRef idx="minor">
+            <a:schemeClr val="lt1"/>
+          </a:fontRef>
+        </p:style>
+        <p:txBody>
+          <a:bodyPr rtlCol="0" anchor="ctr"/>
+          <a:lstStyle/>
+          <a:p>
+            <a:pPr algn="ctr"/>
+            <a:endParaRPr lang="es-ES"/>
+          </a:p>
+        </p:txBody>
+      </p:sp>
+      <p:sp>
+        <p:nvSpPr>
+          <p:cNvPr id="12" name="Rectangle 11"/>
+          <p:cNvSpPr/>
+          <p:nvPr/>
+        </p:nvSpPr>
+        <p:spPr>
+          <a:xfrm>
+            <a:off x="7421217" y="2100467"/>
+            <a:ext cx="974035" cy="569843"/>
+          </a:xfrm>
+          <a:prstGeom prst="rect">
+            <a:avLst/>
+          </a:prstGeom>
+          <a:solidFill>
+            <a:schemeClr val="accent6">
+              <a:lumMod val="60000"/>
+              <a:lumOff val="40000"/>
+            </a:schemeClr>
+          </a:solidFill>
+        </p:spPr>
+        <p:style>
+          <a:lnRef idx="2">
+            <a:schemeClr val="accent1">
+              <a:shade val="50000"/>
+            </a:schemeClr>
+          </a:lnRef>
+          <a:fillRef idx="1">
+            <a:schemeClr val="accent1"/>
+          </a:fillRef>
+          <a:effectRef idx="0">
+            <a:schemeClr val="accent1"/>
+          </a:effectRef>
+          <a:fontRef idx="minor">
+            <a:schemeClr val="lt1"/>
+          </a:fontRef>
+        </p:style>
+        <p:txBody>
+          <a:bodyPr rtlCol="0" anchor="ctr"/>
+          <a:lstStyle/>
+          <a:p>
+            <a:pPr algn="ctr"/>
+            <a:r>
+              <a:rPr lang="es-MX" dirty="0">
+                <a:solidFill>
+                  <a:schemeClr val="tx1"/>
+                </a:solidFill>
+              </a:rPr>
+              <a:t>0.02</a:t>
+            </a:r>
+            <a:endParaRPr lang="es-ES" dirty="0">
+              <a:solidFill>
+                <a:schemeClr val="tx1"/>
+              </a:solidFill>
+            </a:endParaRPr>
+          </a:p>
+        </p:txBody>
+      </p:sp>
+      <p:sp>
+        <p:nvSpPr>
+          <p:cNvPr id="13" name="TextBox 12"/>
+          <p:cNvSpPr txBox="1"/>
+          <p:nvPr/>
+        </p:nvSpPr>
+        <p:spPr>
+          <a:xfrm>
+            <a:off x="4841984" y="994156"/>
+            <a:ext cx="1370888" cy="523220"/>
+          </a:xfrm>
+          <a:prstGeom prst="rect">
+            <a:avLst/>
+          </a:prstGeom>
+          <a:noFill/>
+        </p:spPr>
+        <p:txBody>
+          <a:bodyPr wrap="none" rtlCol="0">
+            <a:spAutoFit/>
+          </a:bodyPr>
+          <a:lstStyle/>
+          <a:p>
+            <a:r>
+              <a:rPr lang="es-MX" sz="2800" dirty="0"/>
+              <a:t>Outputs</a:t>
+            </a:r>
+            <a:endParaRPr lang="es-ES" dirty="0"/>
+          </a:p>
+        </p:txBody>
+      </p:sp>
+    </p:spTree>
+    <p:extLst>
+      <p:ext uri="{BB962C8B-B14F-4D97-AF65-F5344CB8AC3E}">
+        <p14:creationId xmlns:p14="http://schemas.microsoft.com/office/powerpoint/2010/main" val="547407720"/>
+      </p:ext>
+    </p:extLst>
+  </p:cSld>
+  <p:clrMapOvr>
+    <a:masterClrMapping/>
+  </p:clrMapOvr>
+</p:sld>
+</file>
+
+<file path=ppt/slides/slide5.xml><?xml version="1.0" encoding="utf-8"?>
+<p:sld xmlns:a="http://schemas.openxmlformats.org/drawingml/2006/main" xmlns:r="http://schemas.openxmlformats.org/officeDocument/2006/relationships" xmlns:p="http://schemas.openxmlformats.org/presentationml/2006/main">
+  <p:cSld>
+    <p:spTree>
+      <p:nvGrpSpPr>
+        <p:cNvPr id="1" name=""/>
+        <p:cNvGrpSpPr/>
+        <p:nvPr/>
+      </p:nvGrpSpPr>
+      <p:grpSpPr>
+        <a:xfrm>
+          <a:off x="0" y="0"/>
+          <a:ext cx="0" cy="0"/>
+          <a:chOff x="0" y="0"/>
+          <a:chExt cx="0" cy="0"/>
+        </a:xfrm>
+      </p:grpSpPr>
+      <p:sp>
+        <p:nvSpPr>
+          <p:cNvPr id="2" name="Rectangle 1"/>
+          <p:cNvSpPr/>
+          <p:nvPr/>
+        </p:nvSpPr>
+        <p:spPr>
+          <a:xfrm>
+            <a:off x="2623930" y="1868557"/>
+            <a:ext cx="967409" cy="715617"/>
+          </a:xfrm>
+          <a:prstGeom prst="rect">
+            <a:avLst/>
+          </a:prstGeom>
+          <a:solidFill>
+            <a:schemeClr val="accent2"/>
+          </a:solidFill>
+        </p:spPr>
+        <p:style>
+          <a:lnRef idx="2">
+            <a:schemeClr val="accent1">
+              <a:shade val="50000"/>
+            </a:schemeClr>
+          </a:lnRef>
+          <a:fillRef idx="1">
+            <a:schemeClr val="accent1"/>
+          </a:fillRef>
+          <a:effectRef idx="0">
+            <a:schemeClr val="accent1"/>
+          </a:effectRef>
+          <a:fontRef idx="minor">
+            <a:schemeClr val="lt1"/>
+          </a:fontRef>
+        </p:style>
+        <p:txBody>
+          <a:bodyPr rtlCol="0" anchor="ctr"/>
+          <a:lstStyle/>
+          <a:p>
+            <a:pPr algn="ctr"/>
+            <a:r>
+              <a:rPr lang="es-MX" dirty="0">
+                <a:solidFill>
+                  <a:schemeClr val="tx1"/>
+                </a:solidFill>
+              </a:rPr>
+              <a:t>From:</a:t>
+            </a:r>
+            <a:endParaRPr lang="es-ES" dirty="0">
+              <a:solidFill>
+                <a:schemeClr val="tx1"/>
+              </a:solidFill>
+            </a:endParaRPr>
+          </a:p>
+        </p:txBody>
+      </p:sp>
+      <p:sp>
+        <p:nvSpPr>
+          <p:cNvPr id="3" name="Rectangle 2"/>
+          <p:cNvSpPr/>
+          <p:nvPr/>
+        </p:nvSpPr>
+        <p:spPr>
+          <a:xfrm>
+            <a:off x="3591339" y="1868556"/>
+            <a:ext cx="4750905" cy="715617"/>
+          </a:xfrm>
+          <a:prstGeom prst="rect">
+            <a:avLst/>
+          </a:prstGeom>
+          <a:solidFill>
+            <a:schemeClr val="accent4"/>
+          </a:solidFill>
+        </p:spPr>
+        <p:style>
+          <a:lnRef idx="2">
+            <a:schemeClr val="accent1">
+              <a:shade val="50000"/>
+            </a:schemeClr>
+          </a:lnRef>
+          <a:fillRef idx="1">
+            <a:schemeClr val="accent1"/>
+          </a:fillRef>
+          <a:effectRef idx="0">
+            <a:schemeClr val="accent1"/>
+          </a:effectRef>
+          <a:fontRef idx="minor">
+            <a:schemeClr val="lt1"/>
+          </a:fontRef>
+        </p:style>
+        <p:txBody>
+          <a:bodyPr rtlCol="0" anchor="ctr"/>
+          <a:lstStyle/>
+          <a:p>
+            <a:pPr algn="ctr"/>
+            <a:r>
+              <a:rPr lang="es-MX" dirty="0">
+                <a:solidFill>
+                  <a:schemeClr val="tx1"/>
+                </a:solidFill>
+              </a:rPr>
+              <a:t>0x5fa78…….</a:t>
+            </a:r>
+            <a:endParaRPr lang="es-ES" dirty="0">
+              <a:solidFill>
+                <a:schemeClr val="tx1"/>
+              </a:solidFill>
+            </a:endParaRPr>
+          </a:p>
+        </p:txBody>
+      </p:sp>
+      <p:sp>
+        <p:nvSpPr>
+          <p:cNvPr id="4" name="Rectangle 3"/>
+          <p:cNvSpPr/>
+          <p:nvPr/>
+        </p:nvSpPr>
+        <p:spPr>
+          <a:xfrm>
+            <a:off x="2623930" y="2584174"/>
+            <a:ext cx="967409" cy="715617"/>
+          </a:xfrm>
+          <a:prstGeom prst="rect">
+            <a:avLst/>
+          </a:prstGeom>
+          <a:solidFill>
+            <a:schemeClr val="accent2"/>
+          </a:solidFill>
+        </p:spPr>
+        <p:style>
+          <a:lnRef idx="2">
+            <a:schemeClr val="accent1">
+              <a:shade val="50000"/>
+            </a:schemeClr>
+          </a:lnRef>
+          <a:fillRef idx="1">
+            <a:schemeClr val="accent1"/>
+          </a:fillRef>
+          <a:effectRef idx="0">
+            <a:schemeClr val="accent1"/>
+          </a:effectRef>
+          <a:fontRef idx="minor">
+            <a:schemeClr val="lt1"/>
+          </a:fontRef>
+        </p:style>
+        <p:txBody>
+          <a:bodyPr rtlCol="0" anchor="ctr"/>
+          <a:lstStyle/>
+          <a:p>
+            <a:pPr algn="ctr"/>
+            <a:r>
+              <a:rPr lang="es-MX" dirty="0">
+                <a:solidFill>
+                  <a:schemeClr val="tx1"/>
+                </a:solidFill>
+              </a:rPr>
+              <a:t>To:</a:t>
+            </a:r>
+            <a:endParaRPr lang="es-ES" dirty="0">
+              <a:solidFill>
+                <a:schemeClr val="tx1"/>
+              </a:solidFill>
+            </a:endParaRPr>
+          </a:p>
+        </p:txBody>
+      </p:sp>
+      <p:sp>
+        <p:nvSpPr>
+          <p:cNvPr id="5" name="Rectangle 4"/>
+          <p:cNvSpPr/>
+          <p:nvPr/>
+        </p:nvSpPr>
+        <p:spPr>
+          <a:xfrm>
+            <a:off x="3591339" y="2584173"/>
+            <a:ext cx="4750905" cy="715617"/>
+          </a:xfrm>
+          <a:prstGeom prst="rect">
+            <a:avLst/>
+          </a:prstGeom>
+          <a:solidFill>
+            <a:schemeClr val="accent4"/>
+          </a:solidFill>
+        </p:spPr>
+        <p:style>
+          <a:lnRef idx="2">
+            <a:schemeClr val="accent1">
+              <a:shade val="50000"/>
+            </a:schemeClr>
+          </a:lnRef>
+          <a:fillRef idx="1">
+            <a:schemeClr val="accent1"/>
+          </a:fillRef>
+          <a:effectRef idx="0">
+            <a:schemeClr val="accent1"/>
+          </a:effectRef>
+          <a:fontRef idx="minor">
+            <a:schemeClr val="lt1"/>
+          </a:fontRef>
+        </p:style>
+        <p:txBody>
+          <a:bodyPr rtlCol="0" anchor="ctr"/>
+          <a:lstStyle/>
+          <a:p>
+            <a:pPr algn="ctr"/>
+            <a:r>
+              <a:rPr lang="es-MX" dirty="0">
+                <a:solidFill>
+                  <a:schemeClr val="tx1"/>
+                </a:solidFill>
+              </a:rPr>
+              <a:t>0x46b88…….</a:t>
+            </a:r>
+            <a:endParaRPr lang="es-ES" dirty="0">
+              <a:solidFill>
+                <a:schemeClr val="tx1"/>
+              </a:solidFill>
+            </a:endParaRPr>
+          </a:p>
+        </p:txBody>
+      </p:sp>
+      <p:sp>
+        <p:nvSpPr>
+          <p:cNvPr id="6" name="Rectangle 5"/>
+          <p:cNvSpPr/>
+          <p:nvPr/>
+        </p:nvSpPr>
+        <p:spPr>
+          <a:xfrm>
+            <a:off x="2623930" y="3299791"/>
+            <a:ext cx="967409" cy="715617"/>
+          </a:xfrm>
+          <a:prstGeom prst="rect">
+            <a:avLst/>
+          </a:prstGeom>
+          <a:solidFill>
+            <a:schemeClr val="accent2"/>
+          </a:solidFill>
+        </p:spPr>
+        <p:style>
+          <a:lnRef idx="2">
+            <a:schemeClr val="accent1">
+              <a:shade val="50000"/>
+            </a:schemeClr>
+          </a:lnRef>
+          <a:fillRef idx="1">
+            <a:schemeClr val="accent1"/>
+          </a:fillRef>
+          <a:effectRef idx="0">
+            <a:schemeClr val="accent1"/>
+          </a:effectRef>
+          <a:fontRef idx="minor">
+            <a:schemeClr val="lt1"/>
+          </a:fontRef>
+        </p:style>
+        <p:txBody>
+          <a:bodyPr rtlCol="0" anchor="ctr"/>
+          <a:lstStyle/>
+          <a:p>
+            <a:pPr algn="ctr"/>
+            <a:r>
+              <a:rPr lang="es-MX" dirty="0" err="1">
+                <a:solidFill>
+                  <a:schemeClr val="tx1"/>
+                </a:solidFill>
+              </a:rPr>
+              <a:t>Value</a:t>
+            </a:r>
+            <a:r>
+              <a:rPr lang="es-MX" dirty="0">
+                <a:solidFill>
+                  <a:schemeClr val="tx1"/>
+                </a:solidFill>
+              </a:rPr>
+              <a:t>:</a:t>
+            </a:r>
+            <a:endParaRPr lang="es-ES" dirty="0">
+              <a:solidFill>
+                <a:schemeClr val="tx1"/>
+              </a:solidFill>
+            </a:endParaRPr>
+          </a:p>
+        </p:txBody>
+      </p:sp>
+      <p:sp>
+        <p:nvSpPr>
+          <p:cNvPr id="7" name="Rectangle 6"/>
+          <p:cNvSpPr/>
+          <p:nvPr/>
+        </p:nvSpPr>
+        <p:spPr>
+          <a:xfrm>
+            <a:off x="3591339" y="3299790"/>
+            <a:ext cx="4750905" cy="715617"/>
+          </a:xfrm>
+          <a:prstGeom prst="rect">
+            <a:avLst/>
+          </a:prstGeom>
+          <a:solidFill>
+            <a:schemeClr val="accent4"/>
+          </a:solidFill>
+        </p:spPr>
+        <p:style>
+          <a:lnRef idx="2">
+            <a:schemeClr val="accent1">
+              <a:shade val="50000"/>
+            </a:schemeClr>
+          </a:lnRef>
+          <a:fillRef idx="1">
+            <a:schemeClr val="accent1"/>
+          </a:fillRef>
+          <a:effectRef idx="0">
+            <a:schemeClr val="accent1"/>
+          </a:effectRef>
+          <a:fontRef idx="minor">
+            <a:schemeClr val="lt1"/>
+          </a:fontRef>
+        </p:style>
+        <p:txBody>
+          <a:bodyPr rtlCol="0" anchor="ctr"/>
+          <a:lstStyle/>
+          <a:p>
+            <a:pPr algn="ctr"/>
+            <a:r>
+              <a:rPr lang="es-MX" dirty="0">
+                <a:solidFill>
+                  <a:schemeClr val="tx1"/>
+                </a:solidFill>
+              </a:rPr>
+              <a:t>0.012</a:t>
+            </a:r>
+            <a:endParaRPr lang="es-ES" dirty="0">
+              <a:solidFill>
+                <a:schemeClr val="tx1"/>
+              </a:solidFill>
+            </a:endParaRPr>
+          </a:p>
+        </p:txBody>
+      </p:sp>
+    </p:spTree>
+    <p:extLst>
+      <p:ext uri="{BB962C8B-B14F-4D97-AF65-F5344CB8AC3E}">
+        <p14:creationId xmlns:p14="http://schemas.microsoft.com/office/powerpoint/2010/main" val="3355114092"/>
+      </p:ext>
+    </p:extLst>
+  </p:cSld>
+  <p:clrMapOvr>
+    <a:masterClrMapping/>
+  </p:clrMapOvr>
+</p:sld>
+</file>
+
+<file path=ppt/slides/slide6.xml><?xml version="1.0" encoding="utf-8"?>
+<p:sld xmlns:a="http://schemas.openxmlformats.org/drawingml/2006/main" xmlns:r="http://schemas.openxmlformats.org/officeDocument/2006/relationships" xmlns:p="http://schemas.openxmlformats.org/presentationml/2006/main">
+  <p:cSld>
+    <p:spTree>
+      <p:nvGrpSpPr>
+        <p:cNvPr id="1" name=""/>
+        <p:cNvGrpSpPr/>
+        <p:nvPr/>
+      </p:nvGrpSpPr>
+      <p:grpSpPr>
+        <a:xfrm>
+          <a:off x="0" y="0"/>
+          <a:ext cx="0" cy="0"/>
+          <a:chOff x="0" y="0"/>
+          <a:chExt cx="0" cy="0"/>
+        </a:xfrm>
+      </p:grpSpPr>
+      <p:sp>
+        <p:nvSpPr>
+          <p:cNvPr id="2" name="Title 1"/>
+          <p:cNvSpPr>
+            <a:spLocks noGrp="1"/>
+          </p:cNvSpPr>
+          <p:nvPr>
+            <p:ph type="title"/>
+          </p:nvPr>
+        </p:nvSpPr>
+        <p:spPr>
+          <a:xfrm>
+            <a:off x="866213" y="280395"/>
+            <a:ext cx="10515600" cy="1325563"/>
+          </a:xfrm>
+        </p:spPr>
+        <p:txBody>
+          <a:bodyPr/>
+          <a:lstStyle/>
+          <a:p>
+            <a:r>
+              <a:rPr lang="en-US" dirty="0"/>
+              <a:t>Nodes</a:t>
+            </a:r>
+          </a:p>
+        </p:txBody>
+      </p:sp>
+      <p:sp>
+        <p:nvSpPr>
+          <p:cNvPr id="3" name="Oval 2"/>
+          <p:cNvSpPr/>
+          <p:nvPr/>
+        </p:nvSpPr>
+        <p:spPr>
+          <a:xfrm>
+            <a:off x="5087155" y="1252806"/>
+            <a:ext cx="875763" cy="875763"/>
+          </a:xfrm>
+          <a:prstGeom prst="ellipse">
+            <a:avLst/>
+          </a:prstGeom>
+          <a:solidFill>
+            <a:srgbClr val="FFC000"/>
+          </a:solidFill>
+        </p:spPr>
+        <p:style>
+          <a:lnRef idx="2">
+            <a:schemeClr val="accent1">
+              <a:shade val="50000"/>
+            </a:schemeClr>
+          </a:lnRef>
+          <a:fillRef idx="1">
+            <a:schemeClr val="accent1"/>
+          </a:fillRef>
+          <a:effectRef idx="0">
+            <a:schemeClr val="accent1"/>
+          </a:effectRef>
+          <a:fontRef idx="minor">
+            <a:schemeClr val="lt1"/>
+          </a:fontRef>
+        </p:style>
+        <p:txBody>
+          <a:bodyPr rtlCol="0" anchor="ctr"/>
+          <a:lstStyle/>
+          <a:p>
+            <a:pPr algn="ctr"/>
+            <a:endParaRPr lang="en-US"/>
+          </a:p>
+        </p:txBody>
+      </p:sp>
+      <p:sp>
+        <p:nvSpPr>
+          <p:cNvPr id="4" name="Oval 3"/>
+          <p:cNvSpPr/>
+          <p:nvPr/>
+        </p:nvSpPr>
+        <p:spPr>
+          <a:xfrm>
+            <a:off x="2187262" y="3066581"/>
+            <a:ext cx="875763" cy="875763"/>
+          </a:xfrm>
+          <a:prstGeom prst="ellipse">
+            <a:avLst/>
+          </a:prstGeom>
+          <a:solidFill>
+            <a:srgbClr val="FFC000"/>
+          </a:solidFill>
+        </p:spPr>
+        <p:style>
+          <a:lnRef idx="2">
+            <a:schemeClr val="accent1">
+              <a:shade val="50000"/>
+            </a:schemeClr>
+          </a:lnRef>
+          <a:fillRef idx="1">
+            <a:schemeClr val="accent1"/>
+          </a:fillRef>
+          <a:effectRef idx="0">
+            <a:schemeClr val="accent1"/>
+          </a:effectRef>
+          <a:fontRef idx="minor">
+            <a:schemeClr val="lt1"/>
+          </a:fontRef>
+        </p:style>
+        <p:txBody>
+          <a:bodyPr rtlCol="0" anchor="ctr"/>
+          <a:lstStyle/>
+          <a:p>
+            <a:pPr algn="ctr"/>
+            <a:endParaRPr lang="en-US"/>
+          </a:p>
+        </p:txBody>
+      </p:sp>
+      <p:sp>
+        <p:nvSpPr>
+          <p:cNvPr id="5" name="Oval 4"/>
+          <p:cNvSpPr/>
+          <p:nvPr/>
+        </p:nvSpPr>
+        <p:spPr>
+          <a:xfrm>
+            <a:off x="4376670" y="5088564"/>
+            <a:ext cx="875763" cy="875763"/>
+          </a:xfrm>
+          <a:prstGeom prst="ellipse">
+            <a:avLst/>
+          </a:prstGeom>
+          <a:solidFill>
+            <a:srgbClr val="FFC000"/>
+          </a:solidFill>
+        </p:spPr>
+        <p:style>
+          <a:lnRef idx="2">
+            <a:schemeClr val="accent1">
+              <a:shade val="50000"/>
+            </a:schemeClr>
+          </a:lnRef>
+          <a:fillRef idx="1">
+            <a:schemeClr val="accent1"/>
+          </a:fillRef>
+          <a:effectRef idx="0">
+            <a:schemeClr val="accent1"/>
+          </a:effectRef>
+          <a:fontRef idx="minor">
+            <a:schemeClr val="lt1"/>
+          </a:fontRef>
+        </p:style>
+        <p:txBody>
+          <a:bodyPr rtlCol="0" anchor="ctr"/>
+          <a:lstStyle/>
+          <a:p>
+            <a:pPr algn="ctr"/>
+            <a:endParaRPr lang="en-US"/>
+          </a:p>
+        </p:txBody>
+      </p:sp>
+      <p:sp>
+        <p:nvSpPr>
+          <p:cNvPr id="6" name="Oval 5"/>
+          <p:cNvSpPr/>
+          <p:nvPr/>
+        </p:nvSpPr>
+        <p:spPr>
+          <a:xfrm>
+            <a:off x="6746384" y="3861114"/>
+            <a:ext cx="875763" cy="875763"/>
+          </a:xfrm>
+          <a:prstGeom prst="ellipse">
+            <a:avLst/>
+          </a:prstGeom>
+          <a:solidFill>
+            <a:srgbClr val="FFC000"/>
+          </a:solidFill>
+        </p:spPr>
+        <p:style>
+          <a:lnRef idx="2">
+            <a:schemeClr val="accent1">
+              <a:shade val="50000"/>
+            </a:schemeClr>
+          </a:lnRef>
+          <a:fillRef idx="1">
+            <a:schemeClr val="accent1"/>
+          </a:fillRef>
+          <a:effectRef idx="0">
+            <a:schemeClr val="accent1"/>
+          </a:effectRef>
+          <a:fontRef idx="minor">
+            <a:schemeClr val="lt1"/>
+          </a:fontRef>
+        </p:style>
+        <p:txBody>
+          <a:bodyPr rtlCol="0" anchor="ctr"/>
+          <a:lstStyle/>
+          <a:p>
+            <a:pPr algn="ctr"/>
+            <a:endParaRPr lang="en-US"/>
+          </a:p>
+        </p:txBody>
+      </p:sp>
+      <p:sp>
+        <p:nvSpPr>
+          <p:cNvPr id="7" name="Oval 6"/>
+          <p:cNvSpPr/>
+          <p:nvPr/>
+        </p:nvSpPr>
+        <p:spPr>
+          <a:xfrm>
+            <a:off x="8910034" y="1940753"/>
+            <a:ext cx="875763" cy="875763"/>
+          </a:xfrm>
+          <a:prstGeom prst="ellipse">
+            <a:avLst/>
+          </a:prstGeom>
+          <a:solidFill>
+            <a:srgbClr val="FFC000"/>
+          </a:solidFill>
+        </p:spPr>
+        <p:style>
+          <a:lnRef idx="2">
+            <a:schemeClr val="accent1">
+              <a:shade val="50000"/>
+            </a:schemeClr>
+          </a:lnRef>
+          <a:fillRef idx="1">
+            <a:schemeClr val="accent1"/>
+          </a:fillRef>
+          <a:effectRef idx="0">
+            <a:schemeClr val="accent1"/>
+          </a:effectRef>
+          <a:fontRef idx="minor">
+            <a:schemeClr val="lt1"/>
+          </a:fontRef>
+        </p:style>
+        <p:txBody>
+          <a:bodyPr rtlCol="0" anchor="ctr"/>
+          <a:lstStyle/>
+          <a:p>
+            <a:pPr algn="ctr"/>
+            <a:endParaRPr lang="en-US"/>
+          </a:p>
+        </p:txBody>
+      </p:sp>
+      <p:cxnSp>
+        <p:nvCxnSpPr>
+          <p:cNvPr id="9" name="Straight Arrow Connector 8"/>
+          <p:cNvCxnSpPr/>
+          <p:nvPr/>
+        </p:nvCxnSpPr>
+        <p:spPr>
+          <a:xfrm flipV="1">
+            <a:off x="2954628" y="1715542"/>
+            <a:ext cx="2152383" cy="1504147"/>
+          </a:xfrm>
+          <a:prstGeom prst="straightConnector1">
+            <a:avLst/>
+          </a:prstGeom>
+          <a:ln w="19050">
+            <a:headEnd type="triangle"/>
+            <a:tailEnd type="triangle"/>
+          </a:ln>
+        </p:spPr>
+        <p:style>
+          <a:lnRef idx="1">
+            <a:schemeClr val="accent1"/>
+          </a:lnRef>
+          <a:fillRef idx="0">
+            <a:schemeClr val="accent1"/>
+          </a:fillRef>
+          <a:effectRef idx="0">
+            <a:schemeClr val="accent1"/>
+          </a:effectRef>
+          <a:fontRef idx="minor">
+            <a:schemeClr val="tx1"/>
+          </a:fontRef>
+        </p:style>
+      </p:cxnSp>
+      <p:cxnSp>
+        <p:nvCxnSpPr>
+          <p:cNvPr id="10" name="Straight Arrow Connector 9"/>
+          <p:cNvCxnSpPr>
+            <a:stCxn id="4" idx="5"/>
+            <a:endCxn id="5" idx="1"/>
+          </p:cNvCxnSpPr>
+          <p:nvPr/>
+        </p:nvCxnSpPr>
+        <p:spPr>
+          <a:xfrm>
+            <a:off x="2934772" y="3814091"/>
+            <a:ext cx="1570151" cy="1402726"/>
+          </a:xfrm>
+          <a:prstGeom prst="straightConnector1">
+            <a:avLst/>
+          </a:prstGeom>
+          <a:ln w="19050">
+            <a:headEnd type="triangle"/>
+            <a:tailEnd type="triangle"/>
+          </a:ln>
+        </p:spPr>
+        <p:style>
+          <a:lnRef idx="1">
+            <a:schemeClr val="accent1"/>
+          </a:lnRef>
+          <a:fillRef idx="0">
+            <a:schemeClr val="accent1"/>
+          </a:fillRef>
+          <a:effectRef idx="0">
+            <a:schemeClr val="accent1"/>
+          </a:effectRef>
+          <a:fontRef idx="minor">
+            <a:schemeClr val="tx1"/>
+          </a:fontRef>
+        </p:style>
+      </p:cxnSp>
+      <p:cxnSp>
+        <p:nvCxnSpPr>
+          <p:cNvPr id="15" name="Straight Arrow Connector 14"/>
+          <p:cNvCxnSpPr>
+            <a:stCxn id="5" idx="6"/>
+            <a:endCxn id="6" idx="3"/>
+          </p:cNvCxnSpPr>
+          <p:nvPr/>
+        </p:nvCxnSpPr>
+        <p:spPr>
+          <a:xfrm flipV="1">
+            <a:off x="5252433" y="4608624"/>
+            <a:ext cx="1622204" cy="917822"/>
+          </a:xfrm>
+          <a:prstGeom prst="straightConnector1">
+            <a:avLst/>
+          </a:prstGeom>
+          <a:ln w="19050">
+            <a:headEnd type="triangle"/>
+            <a:tailEnd type="triangle"/>
+          </a:ln>
+        </p:spPr>
+        <p:style>
+          <a:lnRef idx="1">
+            <a:schemeClr val="accent1"/>
+          </a:lnRef>
+          <a:fillRef idx="0">
+            <a:schemeClr val="accent1"/>
+          </a:fillRef>
+          <a:effectRef idx="0">
+            <a:schemeClr val="accent1"/>
+          </a:effectRef>
+          <a:fontRef idx="minor">
+            <a:schemeClr val="tx1"/>
+          </a:fontRef>
+        </p:style>
+      </p:cxnSp>
+      <p:cxnSp>
+        <p:nvCxnSpPr>
+          <p:cNvPr id="18" name="Straight Arrow Connector 17"/>
+          <p:cNvCxnSpPr>
+            <a:stCxn id="3" idx="5"/>
+            <a:endCxn id="6" idx="1"/>
+          </p:cNvCxnSpPr>
+          <p:nvPr/>
+        </p:nvCxnSpPr>
+        <p:spPr>
+          <a:xfrm>
+            <a:off x="5834665" y="2000316"/>
+            <a:ext cx="1039972" cy="1989051"/>
+          </a:xfrm>
+          <a:prstGeom prst="straightConnector1">
+            <a:avLst/>
+          </a:prstGeom>
+          <a:ln w="19050">
+            <a:headEnd type="triangle"/>
+            <a:tailEnd type="triangle"/>
+          </a:ln>
+        </p:spPr>
+        <p:style>
+          <a:lnRef idx="1">
+            <a:schemeClr val="accent1"/>
+          </a:lnRef>
+          <a:fillRef idx="0">
+            <a:schemeClr val="accent1"/>
+          </a:fillRef>
+          <a:effectRef idx="0">
+            <a:schemeClr val="accent1"/>
+          </a:effectRef>
+          <a:fontRef idx="minor">
+            <a:schemeClr val="tx1"/>
+          </a:fontRef>
+        </p:style>
+      </p:cxnSp>
+      <p:cxnSp>
+        <p:nvCxnSpPr>
+          <p:cNvPr id="21" name="Straight Arrow Connector 20"/>
+          <p:cNvCxnSpPr>
+            <a:endCxn id="7" idx="2"/>
+          </p:cNvCxnSpPr>
+          <p:nvPr/>
+        </p:nvCxnSpPr>
+        <p:spPr>
+          <a:xfrm>
+            <a:off x="5962918" y="1644270"/>
+            <a:ext cx="2947116" cy="734365"/>
+          </a:xfrm>
+          <a:prstGeom prst="straightConnector1">
+            <a:avLst/>
+          </a:prstGeom>
+          <a:ln w="19050">
+            <a:headEnd type="triangle"/>
+            <a:tailEnd type="triangle"/>
+          </a:ln>
+        </p:spPr>
+        <p:style>
+          <a:lnRef idx="1">
+            <a:schemeClr val="accent1"/>
+          </a:lnRef>
+          <a:fillRef idx="0">
+            <a:schemeClr val="accent1"/>
+          </a:fillRef>
+          <a:effectRef idx="0">
+            <a:schemeClr val="accent1"/>
+          </a:effectRef>
+          <a:fontRef idx="minor">
+            <a:schemeClr val="tx1"/>
+          </a:fontRef>
+        </p:style>
+      </p:cxnSp>
+      <p:cxnSp>
+        <p:nvCxnSpPr>
+          <p:cNvPr id="24" name="Straight Arrow Connector 23"/>
+          <p:cNvCxnSpPr>
+            <a:stCxn id="6" idx="6"/>
+            <a:endCxn id="7" idx="3"/>
+          </p:cNvCxnSpPr>
+          <p:nvPr/>
+        </p:nvCxnSpPr>
+        <p:spPr>
+          <a:xfrm flipV="1">
+            <a:off x="7622147" y="2688263"/>
+            <a:ext cx="1416140" cy="1610733"/>
+          </a:xfrm>
+          <a:prstGeom prst="straightConnector1">
+            <a:avLst/>
+          </a:prstGeom>
+          <a:ln w="19050">
+            <a:headEnd type="triangle"/>
+            <a:tailEnd type="triangle"/>
+          </a:ln>
+        </p:spPr>
+        <p:style>
+          <a:lnRef idx="1">
+            <a:schemeClr val="accent1"/>
+          </a:lnRef>
+          <a:fillRef idx="0">
+            <a:schemeClr val="accent1"/>
+          </a:fillRef>
+          <a:effectRef idx="0">
+            <a:schemeClr val="accent1"/>
+          </a:effectRef>
+          <a:fontRef idx="minor">
+            <a:schemeClr val="tx1"/>
+          </a:fontRef>
+        </p:style>
+      </p:cxnSp>
+      <p:sp>
+        <p:nvSpPr>
+          <p:cNvPr id="28" name="Oval 27"/>
+          <p:cNvSpPr/>
+          <p:nvPr/>
+        </p:nvSpPr>
+        <p:spPr>
+          <a:xfrm>
+            <a:off x="3827037" y="1940753"/>
+            <a:ext cx="356047" cy="356047"/>
+          </a:xfrm>
+          <a:prstGeom prst="ellipse">
+            <a:avLst/>
+          </a:prstGeom>
+          <a:solidFill>
+            <a:srgbClr val="FF0000"/>
+          </a:solidFill>
+        </p:spPr>
+        <p:style>
+          <a:lnRef idx="2">
+            <a:schemeClr val="accent1">
+              <a:shade val="50000"/>
+            </a:schemeClr>
+          </a:lnRef>
+          <a:fillRef idx="1">
+            <a:schemeClr val="accent1"/>
+          </a:fillRef>
+          <a:effectRef idx="0">
+            <a:schemeClr val="accent1"/>
+          </a:effectRef>
+          <a:fontRef idx="minor">
+            <a:schemeClr val="lt1"/>
+          </a:fontRef>
+        </p:style>
+        <p:txBody>
+          <a:bodyPr rtlCol="0" anchor="ctr"/>
+          <a:lstStyle/>
+          <a:p>
+            <a:pPr algn="ctr"/>
+            <a:endParaRPr lang="en-US"/>
+          </a:p>
+        </p:txBody>
+      </p:sp>
+      <p:sp>
+        <p:nvSpPr>
+          <p:cNvPr id="30" name="Oval 29"/>
+          <p:cNvSpPr/>
+          <p:nvPr/>
+        </p:nvSpPr>
+        <p:spPr>
+          <a:xfrm>
+            <a:off x="3212875" y="2378634"/>
+            <a:ext cx="356047" cy="356047"/>
+          </a:xfrm>
+          <a:prstGeom prst="ellipse">
+            <a:avLst/>
+          </a:prstGeom>
+          <a:solidFill>
+            <a:srgbClr val="FF0000"/>
+          </a:solidFill>
+        </p:spPr>
+        <p:style>
+          <a:lnRef idx="2">
+            <a:schemeClr val="accent1">
+              <a:shade val="50000"/>
+            </a:schemeClr>
+          </a:lnRef>
+          <a:fillRef idx="1">
+            <a:schemeClr val="accent1"/>
+          </a:fillRef>
+          <a:effectRef idx="0">
+            <a:schemeClr val="accent1"/>
+          </a:effectRef>
+          <a:fontRef idx="minor">
+            <a:schemeClr val="lt1"/>
+          </a:fontRef>
+        </p:style>
+        <p:txBody>
+          <a:bodyPr rtlCol="0" anchor="ctr"/>
+          <a:lstStyle/>
+          <a:p>
+            <a:pPr algn="ctr"/>
+            <a:endParaRPr lang="en-US"/>
+          </a:p>
+        </p:txBody>
+      </p:sp>
+      <p:sp>
+        <p:nvSpPr>
+          <p:cNvPr id="31" name="Oval 30"/>
+          <p:cNvSpPr/>
+          <p:nvPr/>
+        </p:nvSpPr>
+        <p:spPr>
+          <a:xfrm>
+            <a:off x="3361131" y="4558853"/>
+            <a:ext cx="356047" cy="356047"/>
+          </a:xfrm>
+          <a:prstGeom prst="ellipse">
+            <a:avLst/>
+          </a:prstGeom>
+          <a:solidFill>
+            <a:srgbClr val="FF0000"/>
+          </a:solidFill>
+        </p:spPr>
+        <p:style>
+          <a:lnRef idx="2">
+            <a:schemeClr val="accent1">
+              <a:shade val="50000"/>
+            </a:schemeClr>
+          </a:lnRef>
+          <a:fillRef idx="1">
+            <a:schemeClr val="accent1"/>
+          </a:fillRef>
+          <a:effectRef idx="0">
+            <a:schemeClr val="accent1"/>
+          </a:effectRef>
+          <a:fontRef idx="minor">
+            <a:schemeClr val="lt1"/>
+          </a:fontRef>
+        </p:style>
+        <p:txBody>
+          <a:bodyPr rtlCol="0" anchor="ctr"/>
+          <a:lstStyle/>
+          <a:p>
+            <a:pPr algn="ctr"/>
+            <a:endParaRPr lang="en-US"/>
+          </a:p>
+        </p:txBody>
+      </p:sp>
+      <p:sp>
+        <p:nvSpPr>
+          <p:cNvPr id="32" name="Oval 31"/>
+          <p:cNvSpPr/>
+          <p:nvPr/>
+        </p:nvSpPr>
+        <p:spPr>
+          <a:xfrm>
+            <a:off x="6124014" y="5067535"/>
+            <a:ext cx="356047" cy="356047"/>
+          </a:xfrm>
+          <a:prstGeom prst="ellipse">
+            <a:avLst/>
+          </a:prstGeom>
+          <a:solidFill>
+            <a:srgbClr val="FF0000"/>
+          </a:solidFill>
+        </p:spPr>
+        <p:style>
+          <a:lnRef idx="2">
+            <a:schemeClr val="accent1">
+              <a:shade val="50000"/>
+            </a:schemeClr>
+          </a:lnRef>
+          <a:fillRef idx="1">
+            <a:schemeClr val="accent1"/>
+          </a:fillRef>
+          <a:effectRef idx="0">
+            <a:schemeClr val="accent1"/>
+          </a:effectRef>
+          <a:fontRef idx="minor">
+            <a:schemeClr val="lt1"/>
+          </a:fontRef>
+        </p:style>
+        <p:txBody>
+          <a:bodyPr rtlCol="0" anchor="ctr"/>
+          <a:lstStyle/>
+          <a:p>
+            <a:pPr algn="ctr"/>
+            <a:endParaRPr lang="en-US"/>
+          </a:p>
+        </p:txBody>
+      </p:sp>
+      <p:sp>
+        <p:nvSpPr>
+          <p:cNvPr id="33" name="Oval 32"/>
+          <p:cNvSpPr/>
+          <p:nvPr/>
+        </p:nvSpPr>
+        <p:spPr>
+          <a:xfrm>
+            <a:off x="5945990" y="3005977"/>
+            <a:ext cx="356047" cy="356047"/>
+          </a:xfrm>
+          <a:prstGeom prst="ellipse">
+            <a:avLst/>
+          </a:prstGeom>
+          <a:solidFill>
+            <a:srgbClr val="FF0000"/>
+          </a:solidFill>
+        </p:spPr>
+        <p:style>
+          <a:lnRef idx="2">
+            <a:schemeClr val="accent1">
+              <a:shade val="50000"/>
+            </a:schemeClr>
+          </a:lnRef>
+          <a:fillRef idx="1">
+            <a:schemeClr val="accent1"/>
+          </a:fillRef>
+          <a:effectRef idx="0">
+            <a:schemeClr val="accent1"/>
+          </a:effectRef>
+          <a:fontRef idx="minor">
+            <a:schemeClr val="lt1"/>
+          </a:fontRef>
+        </p:style>
+        <p:txBody>
+          <a:bodyPr rtlCol="0" anchor="ctr"/>
+          <a:lstStyle/>
+          <a:p>
+            <a:pPr algn="ctr"/>
+            <a:endParaRPr lang="en-US"/>
+          </a:p>
+        </p:txBody>
+      </p:sp>
+      <p:sp>
+        <p:nvSpPr>
+          <p:cNvPr id="34" name="Oval 33"/>
+          <p:cNvSpPr/>
+          <p:nvPr/>
+        </p:nvSpPr>
+        <p:spPr>
+          <a:xfrm>
+            <a:off x="7436476" y="1584706"/>
+            <a:ext cx="356047" cy="356047"/>
+          </a:xfrm>
+          <a:prstGeom prst="ellipse">
+            <a:avLst/>
+          </a:prstGeom>
+          <a:solidFill>
+            <a:srgbClr val="FF0000"/>
+          </a:solidFill>
+        </p:spPr>
+        <p:style>
+          <a:lnRef idx="2">
+            <a:schemeClr val="accent1">
+              <a:shade val="50000"/>
+            </a:schemeClr>
+          </a:lnRef>
+          <a:fillRef idx="1">
+            <a:schemeClr val="accent1"/>
+          </a:fillRef>
+          <a:effectRef idx="0">
+            <a:schemeClr val="accent1"/>
+          </a:effectRef>
+          <a:fontRef idx="minor">
+            <a:schemeClr val="lt1"/>
+          </a:fontRef>
+        </p:style>
+        <p:txBody>
+          <a:bodyPr rtlCol="0" anchor="ctr"/>
+          <a:lstStyle/>
+          <a:p>
+            <a:pPr algn="ctr"/>
+            <a:endParaRPr lang="en-US"/>
+          </a:p>
+        </p:txBody>
+      </p:sp>
+      <p:sp>
+        <p:nvSpPr>
+          <p:cNvPr id="35" name="Rectangle 34"/>
+          <p:cNvSpPr/>
+          <p:nvPr/>
+        </p:nvSpPr>
+        <p:spPr>
+          <a:xfrm rot="19489243">
+            <a:off x="3898235" y="2428970"/>
+            <a:ext cx="810361" cy="415170"/>
+          </a:xfrm>
+          <a:prstGeom prst="rect">
+            <a:avLst/>
+          </a:prstGeom>
+          <a:solidFill>
+            <a:srgbClr val="92D050"/>
+          </a:solidFill>
+        </p:spPr>
+        <p:style>
+          <a:lnRef idx="2">
+            <a:schemeClr val="accent1">
+              <a:shade val="50000"/>
+            </a:schemeClr>
+          </a:lnRef>
+          <a:fillRef idx="1">
+            <a:schemeClr val="accent1"/>
+          </a:fillRef>
+          <a:effectRef idx="0">
+            <a:schemeClr val="accent1"/>
+          </a:effectRef>
+          <a:fontRef idx="minor">
+            <a:schemeClr val="lt1"/>
+          </a:fontRef>
+        </p:style>
+        <p:txBody>
+          <a:bodyPr rtlCol="0" anchor="ctr"/>
+          <a:lstStyle/>
+          <a:p>
+            <a:pPr algn="ctr"/>
+            <a:endParaRPr lang="en-US"/>
+          </a:p>
+        </p:txBody>
+      </p:sp>
+      <p:sp>
+        <p:nvSpPr>
+          <p:cNvPr id="36" name="Rectangle 35"/>
+          <p:cNvSpPr/>
+          <p:nvPr/>
+        </p:nvSpPr>
+        <p:spPr>
+          <a:xfrm rot="18790922">
+            <a:off x="8330889" y="3332164"/>
+            <a:ext cx="741053" cy="379662"/>
+          </a:xfrm>
+          <a:prstGeom prst="rect">
+            <a:avLst/>
+          </a:prstGeom>
+          <a:solidFill>
+            <a:srgbClr val="92D050"/>
+          </a:solidFill>
+        </p:spPr>
+        <p:style>
+          <a:lnRef idx="2">
+            <a:schemeClr val="accent1">
+              <a:shade val="50000"/>
+            </a:schemeClr>
+          </a:lnRef>
+          <a:fillRef idx="1">
+            <a:schemeClr val="accent1"/>
+          </a:fillRef>
+          <a:effectRef idx="0">
+            <a:schemeClr val="accent1"/>
+          </a:effectRef>
+          <a:fontRef idx="minor">
+            <a:schemeClr val="lt1"/>
+          </a:fontRef>
+        </p:style>
+        <p:txBody>
+          <a:bodyPr rtlCol="0" anchor="ctr"/>
+          <a:lstStyle/>
+          <a:p>
+            <a:pPr algn="ctr"/>
+            <a:endParaRPr lang="en-US"/>
+          </a:p>
+        </p:txBody>
+      </p:sp>
+      <p:sp>
+        <p:nvSpPr>
+          <p:cNvPr id="37" name="Rectangle 36"/>
+          <p:cNvSpPr/>
+          <p:nvPr/>
+        </p:nvSpPr>
+        <p:spPr>
+          <a:xfrm rot="19825340">
+            <a:off x="5623220" y="4606433"/>
+            <a:ext cx="741053" cy="379662"/>
+          </a:xfrm>
+          <a:prstGeom prst="rect">
+            <a:avLst/>
+          </a:prstGeom>
+          <a:solidFill>
+            <a:srgbClr val="92D050"/>
+          </a:solidFill>
+        </p:spPr>
+        <p:style>
+          <a:lnRef idx="2">
+            <a:schemeClr val="accent1">
+              <a:shade val="50000"/>
+            </a:schemeClr>
+          </a:lnRef>
+          <a:fillRef idx="1">
+            <a:schemeClr val="accent1"/>
+          </a:fillRef>
+          <a:effectRef idx="0">
+            <a:schemeClr val="accent1"/>
+          </a:effectRef>
+          <a:fontRef idx="minor">
+            <a:schemeClr val="lt1"/>
+          </a:fontRef>
+        </p:style>
+        <p:txBody>
+          <a:bodyPr rtlCol="0" anchor="ctr"/>
+          <a:lstStyle/>
+          <a:p>
+            <a:pPr algn="ctr"/>
+            <a:endParaRPr lang="en-US"/>
+          </a:p>
+        </p:txBody>
+      </p:sp>
+      <p:sp>
+        <p:nvSpPr>
+          <p:cNvPr id="38" name="Rectangle 37"/>
+          <p:cNvSpPr/>
+          <p:nvPr/>
+        </p:nvSpPr>
+        <p:spPr>
+          <a:xfrm rot="845580">
+            <a:off x="7116211" y="2130574"/>
+            <a:ext cx="741053" cy="379662"/>
+          </a:xfrm>
+          <a:prstGeom prst="rect">
+            <a:avLst/>
+          </a:prstGeom>
+          <a:solidFill>
+            <a:srgbClr val="92D050"/>
+          </a:solidFill>
+        </p:spPr>
+        <p:style>
+          <a:lnRef idx="2">
+            <a:schemeClr val="accent1">
+              <a:shade val="50000"/>
+            </a:schemeClr>
+          </a:lnRef>
+          <a:fillRef idx="1">
+            <a:schemeClr val="accent1"/>
+          </a:fillRef>
+          <a:effectRef idx="0">
+            <a:schemeClr val="accent1"/>
+          </a:effectRef>
+          <a:fontRef idx="minor">
+            <a:schemeClr val="lt1"/>
+          </a:fontRef>
+        </p:style>
+        <p:txBody>
+          <a:bodyPr rtlCol="0" anchor="ctr"/>
+          <a:lstStyle/>
+          <a:p>
+            <a:pPr algn="ctr"/>
+            <a:endParaRPr lang="en-US"/>
+          </a:p>
+        </p:txBody>
+      </p:sp>
+      <p:sp>
+        <p:nvSpPr>
+          <p:cNvPr id="39" name="Oval 38"/>
+          <p:cNvSpPr/>
+          <p:nvPr/>
+        </p:nvSpPr>
+        <p:spPr>
+          <a:xfrm>
+            <a:off x="988321" y="3039665"/>
+            <a:ext cx="356047" cy="356047"/>
+          </a:xfrm>
+          <a:prstGeom prst="ellipse">
+            <a:avLst/>
+          </a:prstGeom>
+          <a:solidFill>
+            <a:srgbClr val="FF0000"/>
+          </a:solidFill>
+        </p:spPr>
+        <p:style>
+          <a:lnRef idx="2">
+            <a:schemeClr val="accent1">
+              <a:shade val="50000"/>
+            </a:schemeClr>
+          </a:lnRef>
+          <a:fillRef idx="1">
+            <a:schemeClr val="accent1"/>
+          </a:fillRef>
+          <a:effectRef idx="0">
+            <a:schemeClr val="accent1"/>
+          </a:effectRef>
+          <a:fontRef idx="minor">
+            <a:schemeClr val="lt1"/>
+          </a:fontRef>
+        </p:style>
+        <p:txBody>
+          <a:bodyPr rtlCol="0" anchor="ctr"/>
+          <a:lstStyle/>
+          <a:p>
+            <a:pPr algn="ctr"/>
+            <a:endParaRPr lang="en-US"/>
+          </a:p>
+        </p:txBody>
+      </p:sp>
+      <p:cxnSp>
+        <p:nvCxnSpPr>
+          <p:cNvPr id="41" name="Straight Arrow Connector 40"/>
+          <p:cNvCxnSpPr/>
+          <p:nvPr/>
+        </p:nvCxnSpPr>
+        <p:spPr>
+          <a:xfrm flipH="1">
+            <a:off x="2934772" y="-267286"/>
+            <a:ext cx="82639" cy="42203"/>
+          </a:xfrm>
+          <a:prstGeom prst="straightConnector1">
+            <a:avLst/>
+          </a:prstGeom>
+          <a:ln>
+            <a:tailEnd type="triangle"/>
+          </a:ln>
+        </p:spPr>
+        <p:style>
+          <a:lnRef idx="1">
+            <a:schemeClr val="accent1"/>
+          </a:lnRef>
+          <a:fillRef idx="0">
+            <a:schemeClr val="accent1"/>
+          </a:fillRef>
+          <a:effectRef idx="0">
+            <a:schemeClr val="accent1"/>
+          </a:effectRef>
+          <a:fontRef idx="minor">
+            <a:schemeClr val="tx1"/>
+          </a:fontRef>
+        </p:style>
+      </p:cxnSp>
+      <p:cxnSp>
+        <p:nvCxnSpPr>
+          <p:cNvPr id="43" name="Straight Arrow Connector 42"/>
+          <p:cNvCxnSpPr>
+            <a:endCxn id="4" idx="2"/>
+          </p:cNvCxnSpPr>
+          <p:nvPr/>
+        </p:nvCxnSpPr>
+        <p:spPr>
+          <a:xfrm>
+            <a:off x="464234" y="3502855"/>
+            <a:ext cx="1723028" cy="1608"/>
+          </a:xfrm>
+          <a:prstGeom prst="straightConnector1">
+            <a:avLst/>
+          </a:prstGeom>
+          <a:ln w="19050">
+            <a:tailEnd type="triangle"/>
+          </a:ln>
+        </p:spPr>
+        <p:style>
+          <a:lnRef idx="1">
+            <a:schemeClr val="accent1"/>
+          </a:lnRef>
+          <a:fillRef idx="0">
+            <a:schemeClr val="accent1"/>
+          </a:fillRef>
+          <a:effectRef idx="0">
+            <a:schemeClr val="accent1"/>
+          </a:effectRef>
+          <a:fontRef idx="minor">
+            <a:schemeClr val="tx1"/>
+          </a:fontRef>
+        </p:style>
+      </p:cxnSp>
+    </p:spTree>
+    <p:extLst>
+      <p:ext uri="{BB962C8B-B14F-4D97-AF65-F5344CB8AC3E}">
+        <p14:creationId xmlns:p14="http://schemas.microsoft.com/office/powerpoint/2010/main" val="1577733768"/>
+      </p:ext>
+    </p:extLst>
+  </p:cSld>
+  <p:clrMapOvr>
+    <a:masterClrMapping/>
+  </p:clrMapOvr>
+</p:sld>
+</file>
+
+<file path=ppt/slides/slide7.xml><?xml version="1.0" encoding="utf-8"?>
+<p:sld xmlns:a="http://schemas.openxmlformats.org/drawingml/2006/main" xmlns:r="http://schemas.openxmlformats.org/officeDocument/2006/relationships" xmlns:p="http://schemas.openxmlformats.org/presentationml/2006/main">
+  <p:cSld>
+    <p:spTree>
+      <p:nvGrpSpPr>
+        <p:cNvPr id="1" name=""/>
+        <p:cNvGrpSpPr/>
+        <p:nvPr/>
+      </p:nvGrpSpPr>
+      <p:grpSpPr>
+        <a:xfrm>
+          <a:off x="0" y="0"/>
+          <a:ext cx="0" cy="0"/>
+          <a:chOff x="0" y="0"/>
+          <a:chExt cx="0" cy="0"/>
+        </a:xfrm>
+      </p:grpSpPr>
+      <p:sp>
+        <p:nvSpPr>
+          <p:cNvPr id="4" name="Title 3"/>
+          <p:cNvSpPr>
+            <a:spLocks noGrp="1"/>
+          </p:cNvSpPr>
+          <p:nvPr>
+            <p:ph type="title"/>
+          </p:nvPr>
+        </p:nvSpPr>
+        <p:spPr/>
+        <p:txBody>
+          <a:bodyPr/>
+          <a:lstStyle/>
+          <a:p>
+            <a:r>
+              <a:rPr lang="en-US" dirty="0"/>
+              <a:t>Mining</a:t>
+            </a:r>
+          </a:p>
+        </p:txBody>
+      </p:sp>
+      <p:sp>
+        <p:nvSpPr>
+          <p:cNvPr id="5" name="Oval 4"/>
+          <p:cNvSpPr/>
+          <p:nvPr/>
+        </p:nvSpPr>
+        <p:spPr>
+          <a:xfrm>
+            <a:off x="3451538" y="1365161"/>
+            <a:ext cx="4842457" cy="4842457"/>
+          </a:xfrm>
+          <a:prstGeom prst="ellipse">
+            <a:avLst/>
+          </a:prstGeom>
+          <a:solidFill>
+            <a:srgbClr val="FFC000"/>
+          </a:solidFill>
+        </p:spPr>
+        <p:style>
+          <a:lnRef idx="2">
+            <a:schemeClr val="accent1">
+              <a:shade val="50000"/>
+            </a:schemeClr>
+          </a:lnRef>
+          <a:fillRef idx="1">
+            <a:schemeClr val="accent1"/>
+          </a:fillRef>
+          <a:effectRef idx="0">
+            <a:schemeClr val="accent1"/>
+          </a:effectRef>
+          <a:fontRef idx="minor">
+            <a:schemeClr val="lt1"/>
+          </a:fontRef>
+        </p:style>
+        <p:txBody>
+          <a:bodyPr rtlCol="0" anchor="ctr"/>
+          <a:lstStyle/>
+          <a:p>
+            <a:pPr algn="ctr"/>
+            <a:endParaRPr lang="en-US" dirty="0"/>
+          </a:p>
+        </p:txBody>
+      </p:sp>
+      <p:sp>
+        <p:nvSpPr>
+          <p:cNvPr id="6" name="Oval 5"/>
+          <p:cNvSpPr/>
+          <p:nvPr/>
+        </p:nvSpPr>
+        <p:spPr>
+          <a:xfrm>
+            <a:off x="3726259" y="3329191"/>
+            <a:ext cx="347730" cy="347730"/>
+          </a:xfrm>
+          <a:prstGeom prst="ellipse">
+            <a:avLst/>
+          </a:prstGeom>
+          <a:solidFill>
+            <a:srgbClr val="FF0000"/>
+          </a:solidFill>
+        </p:spPr>
+        <p:style>
+          <a:lnRef idx="2">
+            <a:schemeClr val="accent1">
+              <a:shade val="50000"/>
+            </a:schemeClr>
+          </a:lnRef>
+          <a:fillRef idx="1">
+            <a:schemeClr val="accent1"/>
+          </a:fillRef>
+          <a:effectRef idx="0">
+            <a:schemeClr val="accent1"/>
+          </a:effectRef>
+          <a:fontRef idx="minor">
+            <a:schemeClr val="lt1"/>
+          </a:fontRef>
+        </p:style>
+        <p:txBody>
+          <a:bodyPr rtlCol="0" anchor="ctr"/>
+          <a:lstStyle/>
+          <a:p>
+            <a:pPr algn="ctr"/>
+            <a:endParaRPr lang="en-US"/>
+          </a:p>
+        </p:txBody>
+      </p:sp>
+      <p:sp>
+        <p:nvSpPr>
+          <p:cNvPr id="7" name="Oval 6"/>
+          <p:cNvSpPr/>
+          <p:nvPr/>
+        </p:nvSpPr>
+        <p:spPr>
+          <a:xfrm>
+            <a:off x="4382163" y="3176086"/>
+            <a:ext cx="347730" cy="347730"/>
+          </a:xfrm>
+          <a:prstGeom prst="ellipse">
+            <a:avLst/>
+          </a:prstGeom>
+          <a:solidFill>
+            <a:srgbClr val="FF0000"/>
+          </a:solidFill>
+        </p:spPr>
+        <p:style>
+          <a:lnRef idx="2">
+            <a:schemeClr val="accent1">
+              <a:shade val="50000"/>
+            </a:schemeClr>
+          </a:lnRef>
+          <a:fillRef idx="1">
+            <a:schemeClr val="accent1"/>
+          </a:fillRef>
+          <a:effectRef idx="0">
+            <a:schemeClr val="accent1"/>
+          </a:effectRef>
+          <a:fontRef idx="minor">
+            <a:schemeClr val="lt1"/>
+          </a:fontRef>
+        </p:style>
+        <p:txBody>
+          <a:bodyPr rtlCol="0" anchor="ctr"/>
+          <a:lstStyle/>
+          <a:p>
+            <a:pPr algn="ctr"/>
+            <a:endParaRPr lang="en-US"/>
+          </a:p>
+        </p:txBody>
+      </p:sp>
+      <p:sp>
+        <p:nvSpPr>
+          <p:cNvPr id="8" name="Oval 7"/>
+          <p:cNvSpPr/>
+          <p:nvPr/>
+        </p:nvSpPr>
+        <p:spPr>
+          <a:xfrm>
+            <a:off x="5370490" y="1577661"/>
+            <a:ext cx="347730" cy="347730"/>
+          </a:xfrm>
+          <a:prstGeom prst="ellipse">
+            <a:avLst/>
+          </a:prstGeom>
+          <a:solidFill>
+            <a:srgbClr val="FF0000"/>
+          </a:solidFill>
+        </p:spPr>
+        <p:style>
+          <a:lnRef idx="2">
+            <a:schemeClr val="accent1">
+              <a:shade val="50000"/>
+            </a:schemeClr>
+          </a:lnRef>
+          <a:fillRef idx="1">
+            <a:schemeClr val="accent1"/>
+          </a:fillRef>
+          <a:effectRef idx="0">
+            <a:schemeClr val="accent1"/>
+          </a:effectRef>
+          <a:fontRef idx="minor">
+            <a:schemeClr val="lt1"/>
+          </a:fontRef>
+        </p:style>
+        <p:txBody>
+          <a:bodyPr rtlCol="0" anchor="ctr"/>
+          <a:lstStyle/>
+          <a:p>
+            <a:pPr algn="ctr"/>
+            <a:endParaRPr lang="en-US"/>
+          </a:p>
+        </p:txBody>
+      </p:sp>
+      <p:sp>
+        <p:nvSpPr>
+          <p:cNvPr id="9" name="Oval 8"/>
+          <p:cNvSpPr/>
+          <p:nvPr/>
+        </p:nvSpPr>
+        <p:spPr>
+          <a:xfrm>
+            <a:off x="4121444" y="2556457"/>
+            <a:ext cx="347730" cy="347730"/>
+          </a:xfrm>
+          <a:prstGeom prst="ellipse">
+            <a:avLst/>
+          </a:prstGeom>
+          <a:solidFill>
+            <a:srgbClr val="FF0000"/>
+          </a:solidFill>
+        </p:spPr>
+        <p:style>
+          <a:lnRef idx="2">
+            <a:schemeClr val="accent1">
+              <a:shade val="50000"/>
+            </a:schemeClr>
+          </a:lnRef>
+          <a:fillRef idx="1">
+            <a:schemeClr val="accent1"/>
+          </a:fillRef>
+          <a:effectRef idx="0">
+            <a:schemeClr val="accent1"/>
+          </a:effectRef>
+          <a:fontRef idx="minor">
+            <a:schemeClr val="lt1"/>
+          </a:fontRef>
+        </p:style>
+        <p:txBody>
+          <a:bodyPr rtlCol="0" anchor="ctr"/>
+          <a:lstStyle/>
+          <a:p>
+            <a:pPr algn="ctr"/>
+            <a:endParaRPr lang="en-US"/>
+          </a:p>
+        </p:txBody>
+      </p:sp>
+      <p:sp>
+        <p:nvSpPr>
+          <p:cNvPr id="10" name="Oval 9"/>
+          <p:cNvSpPr/>
+          <p:nvPr/>
+        </p:nvSpPr>
+        <p:spPr>
+          <a:xfrm>
+            <a:off x="5879205" y="1798380"/>
+            <a:ext cx="347730" cy="347730"/>
+          </a:xfrm>
+          <a:prstGeom prst="ellipse">
+            <a:avLst/>
+          </a:prstGeom>
+          <a:solidFill>
+            <a:srgbClr val="FF0000"/>
+          </a:solidFill>
+        </p:spPr>
+        <p:style>
+          <a:lnRef idx="2">
+            <a:schemeClr val="accent1">
+              <a:shade val="50000"/>
+            </a:schemeClr>
+          </a:lnRef>
+          <a:fillRef idx="1">
+            <a:schemeClr val="accent1"/>
+          </a:fillRef>
+          <a:effectRef idx="0">
+            <a:schemeClr val="accent1"/>
+          </a:effectRef>
+          <a:fontRef idx="minor">
+            <a:schemeClr val="lt1"/>
+          </a:fontRef>
+        </p:style>
+        <p:txBody>
+          <a:bodyPr rtlCol="0" anchor="ctr"/>
+          <a:lstStyle/>
+          <a:p>
+            <a:pPr algn="ctr"/>
+            <a:endParaRPr lang="en-US"/>
+          </a:p>
+        </p:txBody>
+      </p:sp>
+      <p:sp>
+        <p:nvSpPr>
+          <p:cNvPr id="11" name="Oval 10"/>
+          <p:cNvSpPr/>
+          <p:nvPr/>
+        </p:nvSpPr>
+        <p:spPr>
+          <a:xfrm>
+            <a:off x="6832242" y="1893194"/>
+            <a:ext cx="347730" cy="347730"/>
+          </a:xfrm>
+          <a:prstGeom prst="ellipse">
+            <a:avLst/>
+          </a:prstGeom>
+          <a:solidFill>
+            <a:srgbClr val="FF0000"/>
+          </a:solidFill>
+        </p:spPr>
+        <p:style>
+          <a:lnRef idx="2">
+            <a:schemeClr val="accent1">
+              <a:shade val="50000"/>
+            </a:schemeClr>
+          </a:lnRef>
+          <a:fillRef idx="1">
+            <a:schemeClr val="accent1"/>
+          </a:fillRef>
+          <a:effectRef idx="0">
+            <a:schemeClr val="accent1"/>
+          </a:effectRef>
+          <a:fontRef idx="minor">
+            <a:schemeClr val="lt1"/>
+          </a:fontRef>
+        </p:style>
+        <p:txBody>
+          <a:bodyPr rtlCol="0" anchor="ctr"/>
+          <a:lstStyle/>
+          <a:p>
+            <a:pPr algn="ctr"/>
+            <a:endParaRPr lang="en-US"/>
+          </a:p>
+        </p:txBody>
+      </p:sp>
+      <p:sp>
+        <p:nvSpPr>
+          <p:cNvPr id="13" name="Rectangle 12"/>
+          <p:cNvSpPr/>
+          <p:nvPr/>
+        </p:nvSpPr>
+        <p:spPr>
+          <a:xfrm>
+            <a:off x="5015248" y="2730322"/>
+            <a:ext cx="1816994" cy="598869"/>
+          </a:xfrm>
+          <a:prstGeom prst="rect">
+            <a:avLst/>
+          </a:prstGeom>
+          <a:solidFill>
+            <a:srgbClr val="92D050"/>
+          </a:solidFill>
+        </p:spPr>
+        <p:style>
+          <a:lnRef idx="2">
+            <a:schemeClr val="accent1">
+              <a:shade val="50000"/>
+            </a:schemeClr>
+          </a:lnRef>
+          <a:fillRef idx="1">
+            <a:schemeClr val="accent1"/>
+          </a:fillRef>
+          <a:effectRef idx="0">
+            <a:schemeClr val="accent1"/>
+          </a:effectRef>
+          <a:fontRef idx="minor">
+            <a:schemeClr val="lt1"/>
+          </a:fontRef>
+        </p:style>
+        <p:txBody>
+          <a:bodyPr rtlCol="0" anchor="ctr"/>
+          <a:lstStyle/>
+          <a:p>
+            <a:pPr algn="ctr"/>
+            <a:endParaRPr lang="en-US"/>
+          </a:p>
+        </p:txBody>
+      </p:sp>
+      <p:sp>
+        <p:nvSpPr>
+          <p:cNvPr id="14" name="Rectangle 13"/>
+          <p:cNvSpPr/>
+          <p:nvPr/>
+        </p:nvSpPr>
+        <p:spPr>
+          <a:xfrm>
+            <a:off x="4995662" y="3507718"/>
+            <a:ext cx="1816994" cy="598869"/>
+          </a:xfrm>
+          <a:prstGeom prst="rect">
+            <a:avLst/>
+          </a:prstGeom>
+          <a:solidFill>
+            <a:srgbClr val="92D050"/>
+          </a:solidFill>
+        </p:spPr>
+        <p:style>
+          <a:lnRef idx="2">
+            <a:schemeClr val="accent1">
+              <a:shade val="50000"/>
+            </a:schemeClr>
+          </a:lnRef>
+          <a:fillRef idx="1">
+            <a:schemeClr val="accent1"/>
+          </a:fillRef>
+          <a:effectRef idx="0">
+            <a:schemeClr val="accent1"/>
+          </a:effectRef>
+          <a:fontRef idx="minor">
+            <a:schemeClr val="lt1"/>
+          </a:fontRef>
+        </p:style>
+        <p:txBody>
+          <a:bodyPr rtlCol="0" anchor="ctr"/>
+          <a:lstStyle/>
+          <a:p>
+            <a:pPr algn="ctr"/>
+            <a:endParaRPr lang="en-US"/>
+          </a:p>
+        </p:txBody>
+      </p:sp>
+      <p:cxnSp>
+        <p:nvCxnSpPr>
+          <p:cNvPr id="19" name="Straight Arrow Connector 18"/>
+          <p:cNvCxnSpPr>
+            <a:stCxn id="14" idx="0"/>
+            <a:endCxn id="13" idx="2"/>
+          </p:cNvCxnSpPr>
+          <p:nvPr/>
+        </p:nvCxnSpPr>
+        <p:spPr>
+          <a:xfrm flipV="1">
+            <a:off x="5904159" y="3329191"/>
+            <a:ext cx="19586" cy="178527"/>
+          </a:xfrm>
+          <a:prstGeom prst="straightConnector1">
+            <a:avLst/>
+          </a:prstGeom>
+          <a:ln>
+            <a:tailEnd type="triangle"/>
+          </a:ln>
+        </p:spPr>
+        <p:style>
+          <a:lnRef idx="1">
+            <a:schemeClr val="accent1"/>
+          </a:lnRef>
+          <a:fillRef idx="0">
+            <a:schemeClr val="accent1"/>
+          </a:fillRef>
+          <a:effectRef idx="0">
+            <a:schemeClr val="accent1"/>
+          </a:effectRef>
+          <a:fontRef idx="minor">
+            <a:schemeClr val="tx1"/>
+          </a:fontRef>
+        </p:style>
+      </p:cxnSp>
+      <p:sp>
+        <p:nvSpPr>
+          <p:cNvPr id="26" name="Oval 25"/>
+          <p:cNvSpPr/>
+          <p:nvPr/>
+        </p:nvSpPr>
+        <p:spPr>
+          <a:xfrm>
+            <a:off x="5196625" y="3601423"/>
+            <a:ext cx="347730" cy="347730"/>
+          </a:xfrm>
+          <a:prstGeom prst="ellipse">
+            <a:avLst/>
+          </a:prstGeom>
+          <a:solidFill>
+            <a:srgbClr val="FF0000"/>
+          </a:solidFill>
+        </p:spPr>
+        <p:style>
+          <a:lnRef idx="2">
+            <a:schemeClr val="accent1">
+              <a:shade val="50000"/>
+            </a:schemeClr>
+          </a:lnRef>
+          <a:fillRef idx="1">
+            <a:schemeClr val="accent1"/>
+          </a:fillRef>
+          <a:effectRef idx="0">
+            <a:schemeClr val="accent1"/>
+          </a:effectRef>
+          <a:fontRef idx="minor">
+            <a:schemeClr val="lt1"/>
+          </a:fontRef>
+        </p:style>
+        <p:txBody>
+          <a:bodyPr rtlCol="0" anchor="ctr"/>
+          <a:lstStyle/>
+          <a:p>
+            <a:pPr algn="ctr"/>
+            <a:endParaRPr lang="en-US"/>
+          </a:p>
+        </p:txBody>
+      </p:sp>
+      <p:sp>
+        <p:nvSpPr>
+          <p:cNvPr id="27" name="Oval 26"/>
+          <p:cNvSpPr/>
+          <p:nvPr/>
+        </p:nvSpPr>
+        <p:spPr>
+          <a:xfrm>
+            <a:off x="5830775" y="3628622"/>
+            <a:ext cx="347730" cy="347730"/>
+          </a:xfrm>
+          <a:prstGeom prst="ellipse">
+            <a:avLst/>
+          </a:prstGeom>
+          <a:solidFill>
+            <a:srgbClr val="FF0000"/>
+          </a:solidFill>
+        </p:spPr>
+        <p:style>
+          <a:lnRef idx="2">
+            <a:schemeClr val="accent1">
+              <a:shade val="50000"/>
+            </a:schemeClr>
+          </a:lnRef>
+          <a:fillRef idx="1">
+            <a:schemeClr val="accent1"/>
+          </a:fillRef>
+          <a:effectRef idx="0">
+            <a:schemeClr val="accent1"/>
+          </a:effectRef>
+          <a:fontRef idx="minor">
+            <a:schemeClr val="lt1"/>
+          </a:fontRef>
+        </p:style>
+        <p:txBody>
+          <a:bodyPr rtlCol="0" anchor="ctr"/>
+          <a:lstStyle/>
+          <a:p>
+            <a:pPr algn="ctr"/>
+            <a:endParaRPr lang="en-US"/>
+          </a:p>
+        </p:txBody>
+      </p:sp>
+      <p:sp>
+        <p:nvSpPr>
+          <p:cNvPr id="28" name="Oval 27"/>
+          <p:cNvSpPr/>
+          <p:nvPr/>
+        </p:nvSpPr>
+        <p:spPr>
+          <a:xfrm>
+            <a:off x="5647251" y="2846564"/>
+            <a:ext cx="347730" cy="347730"/>
+          </a:xfrm>
+          <a:prstGeom prst="ellipse">
+            <a:avLst/>
+          </a:prstGeom>
+          <a:solidFill>
+            <a:srgbClr val="FF0000"/>
+          </a:solidFill>
+        </p:spPr>
+        <p:style>
+          <a:lnRef idx="2">
+            <a:schemeClr val="accent1">
+              <a:shade val="50000"/>
+            </a:schemeClr>
+          </a:lnRef>
+          <a:fillRef idx="1">
+            <a:schemeClr val="accent1"/>
+          </a:fillRef>
+          <a:effectRef idx="0">
+            <a:schemeClr val="accent1"/>
+          </a:effectRef>
+          <a:fontRef idx="minor">
+            <a:schemeClr val="lt1"/>
+          </a:fontRef>
+        </p:style>
+        <p:txBody>
+          <a:bodyPr rtlCol="0" anchor="ctr"/>
+          <a:lstStyle/>
+          <a:p>
+            <a:pPr algn="ctr"/>
+            <a:endParaRPr lang="en-US"/>
+          </a:p>
+        </p:txBody>
+      </p:sp>
+      <p:sp>
+        <p:nvSpPr>
+          <p:cNvPr id="37" name="Rectangle 36"/>
+          <p:cNvSpPr/>
+          <p:nvPr/>
+        </p:nvSpPr>
+        <p:spPr>
+          <a:xfrm>
+            <a:off x="4106751" y="4738215"/>
+            <a:ext cx="1816994" cy="598869"/>
+          </a:xfrm>
+          <a:prstGeom prst="rect">
+            <a:avLst/>
+          </a:prstGeom>
+          <a:solidFill>
+            <a:srgbClr val="92D050"/>
+          </a:solidFill>
+        </p:spPr>
+        <p:style>
+          <a:lnRef idx="2">
+            <a:schemeClr val="accent1">
+              <a:shade val="50000"/>
+            </a:schemeClr>
+          </a:lnRef>
+          <a:fillRef idx="1">
+            <a:schemeClr val="accent1"/>
+          </a:fillRef>
+          <a:effectRef idx="0">
+            <a:schemeClr val="accent1"/>
+          </a:effectRef>
+          <a:fontRef idx="minor">
+            <a:schemeClr val="lt1"/>
+          </a:fontRef>
+        </p:style>
+        <p:txBody>
+          <a:bodyPr rtlCol="0" anchor="ctr"/>
+          <a:lstStyle/>
+          <a:p>
+            <a:pPr algn="ctr"/>
+            <a:endParaRPr lang="en-US"/>
+          </a:p>
+        </p:txBody>
+      </p:sp>
+      <p:sp>
+        <p:nvSpPr>
+          <p:cNvPr id="40" name="Oval 39"/>
+          <p:cNvSpPr/>
+          <p:nvPr/>
+        </p:nvSpPr>
+        <p:spPr>
+          <a:xfrm>
+            <a:off x="4295309" y="4949189"/>
+            <a:ext cx="347730" cy="347730"/>
+          </a:xfrm>
+          <a:prstGeom prst="ellipse">
+            <a:avLst/>
+          </a:prstGeom>
+          <a:solidFill>
+            <a:srgbClr val="FF0000"/>
+          </a:solidFill>
+        </p:spPr>
+        <p:style>
+          <a:lnRef idx="2">
+            <a:schemeClr val="accent1">
+              <a:shade val="50000"/>
+            </a:schemeClr>
+          </a:lnRef>
+          <a:fillRef idx="1">
+            <a:schemeClr val="accent1"/>
+          </a:fillRef>
+          <a:effectRef idx="0">
+            <a:schemeClr val="accent1"/>
+          </a:effectRef>
+          <a:fontRef idx="minor">
+            <a:schemeClr val="lt1"/>
+          </a:fontRef>
+        </p:style>
+        <p:txBody>
+          <a:bodyPr rtlCol="0" anchor="ctr"/>
+          <a:lstStyle/>
+          <a:p>
+            <a:pPr algn="ctr"/>
+            <a:endParaRPr lang="en-US"/>
+          </a:p>
+        </p:txBody>
+      </p:sp>
+      <p:sp>
+        <p:nvSpPr>
+          <p:cNvPr id="41" name="Oval 40"/>
+          <p:cNvSpPr/>
+          <p:nvPr/>
+        </p:nvSpPr>
+        <p:spPr>
+          <a:xfrm>
+            <a:off x="4951213" y="4796084"/>
+            <a:ext cx="347730" cy="347730"/>
+          </a:xfrm>
+          <a:prstGeom prst="ellipse">
+            <a:avLst/>
+          </a:prstGeom>
+          <a:solidFill>
+            <a:srgbClr val="FF0000"/>
+          </a:solidFill>
+        </p:spPr>
+        <p:style>
+          <a:lnRef idx="2">
+            <a:schemeClr val="accent1">
+              <a:shade val="50000"/>
+            </a:schemeClr>
+          </a:lnRef>
+          <a:fillRef idx="1">
+            <a:schemeClr val="accent1"/>
+          </a:fillRef>
+          <a:effectRef idx="0">
+            <a:schemeClr val="accent1"/>
+          </a:effectRef>
+          <a:fontRef idx="minor">
+            <a:schemeClr val="lt1"/>
+          </a:fontRef>
+        </p:style>
+        <p:txBody>
+          <a:bodyPr rtlCol="0" anchor="ctr"/>
+          <a:lstStyle/>
+          <a:p>
+            <a:pPr algn="ctr"/>
+            <a:endParaRPr lang="en-US"/>
+          </a:p>
+        </p:txBody>
+      </p:sp>
+      <p:cxnSp>
+        <p:nvCxnSpPr>
+          <p:cNvPr id="3" name="Straight Arrow Connector 2"/>
+          <p:cNvCxnSpPr>
+            <a:stCxn id="6" idx="4"/>
+            <a:endCxn id="40" idx="0"/>
+          </p:cNvCxnSpPr>
+          <p:nvPr/>
+        </p:nvCxnSpPr>
+        <p:spPr>
+          <a:xfrm>
+            <a:off x="3900124" y="3676921"/>
+            <a:ext cx="569050" cy="1272268"/>
+          </a:xfrm>
+          <a:prstGeom prst="straightConnector1">
+            <a:avLst/>
+          </a:prstGeom>
+          <a:ln w="19050">
+            <a:prstDash val="dash"/>
+            <a:tailEnd type="triangle"/>
+          </a:ln>
+        </p:spPr>
+        <p:style>
+          <a:lnRef idx="1">
+            <a:schemeClr val="accent1"/>
+          </a:lnRef>
+          <a:fillRef idx="0">
+            <a:schemeClr val="accent1"/>
+          </a:fillRef>
+          <a:effectRef idx="0">
+            <a:schemeClr val="accent1"/>
+          </a:effectRef>
+          <a:fontRef idx="minor">
+            <a:schemeClr val="tx1"/>
+          </a:fontRef>
+        </p:style>
+      </p:cxnSp>
+      <p:cxnSp>
+        <p:nvCxnSpPr>
+          <p:cNvPr id="16" name="Straight Arrow Connector 15"/>
+          <p:cNvCxnSpPr>
+            <a:stCxn id="7" idx="4"/>
+            <a:endCxn id="41" idx="0"/>
+          </p:cNvCxnSpPr>
+          <p:nvPr/>
+        </p:nvCxnSpPr>
+        <p:spPr>
+          <a:xfrm>
+            <a:off x="4556028" y="3523816"/>
+            <a:ext cx="569050" cy="1272268"/>
+          </a:xfrm>
+          <a:prstGeom prst="straightConnector1">
+            <a:avLst/>
+          </a:prstGeom>
+          <a:ln w="19050">
+            <a:prstDash val="dash"/>
+            <a:tailEnd type="triangle"/>
+          </a:ln>
+        </p:spPr>
+        <p:style>
+          <a:lnRef idx="1">
+            <a:schemeClr val="accent1"/>
+          </a:lnRef>
+          <a:fillRef idx="0">
+            <a:schemeClr val="accent1"/>
+          </a:fillRef>
+          <a:effectRef idx="0">
+            <a:schemeClr val="accent1"/>
+          </a:effectRef>
+          <a:fontRef idx="minor">
+            <a:schemeClr val="tx1"/>
+          </a:fontRef>
+        </p:style>
+      </p:cxnSp>
+      <p:cxnSp>
+        <p:nvCxnSpPr>
+          <p:cNvPr id="20" name="Straight Arrow Connector 19"/>
+          <p:cNvCxnSpPr/>
+          <p:nvPr/>
+        </p:nvCxnSpPr>
+        <p:spPr>
+          <a:xfrm flipV="1">
+            <a:off x="5125078" y="4106587"/>
+            <a:ext cx="779081" cy="619629"/>
+          </a:xfrm>
+          <a:prstGeom prst="straightConnector1">
+            <a:avLst/>
+          </a:prstGeom>
+          <a:ln>
+            <a:tailEnd type="triangle"/>
+          </a:ln>
+        </p:spPr>
+        <p:style>
+          <a:lnRef idx="1">
+            <a:schemeClr val="accent1"/>
+          </a:lnRef>
+          <a:fillRef idx="0">
+            <a:schemeClr val="accent1"/>
+          </a:fillRef>
+          <a:effectRef idx="0">
+            <a:schemeClr val="accent1"/>
+          </a:effectRef>
+          <a:fontRef idx="minor">
+            <a:schemeClr val="tx1"/>
+          </a:fontRef>
+        </p:style>
+      </p:cxnSp>
+      <p:sp>
+        <p:nvSpPr>
+          <p:cNvPr id="22" name="TextBox 21"/>
+          <p:cNvSpPr txBox="1"/>
+          <p:nvPr/>
+        </p:nvSpPr>
+        <p:spPr>
+          <a:xfrm>
+            <a:off x="4477816" y="5296616"/>
+            <a:ext cx="1167756" cy="369332"/>
+          </a:xfrm>
+          <a:prstGeom prst="rect">
+            <a:avLst/>
+          </a:prstGeom>
+          <a:noFill/>
+        </p:spPr>
+        <p:txBody>
+          <a:bodyPr wrap="none" rtlCol="0">
+            <a:spAutoFit/>
+          </a:bodyPr>
+          <a:lstStyle/>
+          <a:p>
+            <a:r>
+              <a:rPr lang="en-US" dirty="0"/>
+              <a:t>New Block</a:t>
+            </a:r>
+          </a:p>
+        </p:txBody>
+      </p:sp>
+    </p:spTree>
+    <p:extLst>
+      <p:ext uri="{BB962C8B-B14F-4D97-AF65-F5344CB8AC3E}">
+        <p14:creationId xmlns:p14="http://schemas.microsoft.com/office/powerpoint/2010/main" val="3931722828"/>
+      </p:ext>
+    </p:extLst>
+  </p:cSld>
+  <p:clrMapOvr>
+    <a:masterClrMapping/>
+  </p:clrMapOvr>
+</p:sld>
+</file>
+
 <file path=ppt/theme/theme1.xml><?xml version="1.0" encoding="utf-8"?>
 <a:theme xmlns:a="http://schemas.openxmlformats.org/drawingml/2006/main" name="Office Theme">
   <a:themeElements>

</xml_diff>

<commit_message>
More images and slides
</commit_message>
<xml_diff>
--- a/ConnBlockchains/images/BlockchainImages.pptx
+++ b/ConnBlockchains/images/BlockchainImages.pptx
@@ -3150,7 +3150,7 @@
           <a:prstGeom prst="straightConnector1">
             <a:avLst/>
           </a:prstGeom>
-          <a:ln>
+          <a:ln w="25400">
             <a:tailEnd type="arrow"/>
           </a:ln>
         </p:spPr>
@@ -3384,7 +3384,7 @@
           <a:prstGeom prst="straightConnector1">
             <a:avLst/>
           </a:prstGeom>
-          <a:ln>
+          <a:ln w="25400">
             <a:tailEnd type="arrow"/>
           </a:ln>
         </p:spPr>
@@ -3478,7 +3478,7 @@
           <a:prstGeom prst="straightConnector1">
             <a:avLst/>
           </a:prstGeom>
-          <a:ln>
+          <a:ln w="25400">
             <a:prstDash val="dash"/>
             <a:tailEnd type="arrow"/>
           </a:ln>
@@ -4482,7 +4482,7 @@
           <a:prstGeom prst="straightConnector1">
             <a:avLst/>
           </a:prstGeom>
-          <a:ln>
+          <a:ln w="25400">
             <a:tailEnd type="arrow"/>
           </a:ln>
         </p:spPr>
@@ -4716,7 +4716,7 @@
           <a:prstGeom prst="straightConnector1">
             <a:avLst/>
           </a:prstGeom>
-          <a:ln>
+          <a:ln w="25400">
             <a:tailEnd type="arrow"/>
           </a:ln>
         </p:spPr>
@@ -4810,7 +4810,7 @@
           <a:prstGeom prst="straightConnector1">
             <a:avLst/>
           </a:prstGeom>
-          <a:ln>
+          <a:ln w="25400">
             <a:prstDash val="dash"/>
             <a:tailEnd type="arrow"/>
           </a:ln>
@@ -4947,7 +4947,7 @@
           <a:prstGeom prst="straightConnector1">
             <a:avLst/>
           </a:prstGeom>
-          <a:ln>
+          <a:ln w="25400">
             <a:tailEnd type="arrow"/>
           </a:ln>
         </p:spPr>
@@ -4982,7 +4982,7 @@
           <a:prstGeom prst="straightConnector1">
             <a:avLst/>
           </a:prstGeom>
-          <a:ln>
+          <a:ln w="25400">
             <a:tailEnd type="arrow"/>
           </a:ln>
         </p:spPr>
@@ -5015,7 +5015,7 @@
           <a:prstGeom prst="straightConnector1">
             <a:avLst/>
           </a:prstGeom>
-          <a:ln>
+          <a:ln w="25400">
             <a:prstDash val="dash"/>
             <a:tailEnd type="arrow"/>
           </a:ln>
@@ -5280,7 +5280,7 @@
           <a:prstGeom prst="straightConnector1">
             <a:avLst/>
           </a:prstGeom>
-          <a:ln>
+          <a:ln w="25400">
             <a:tailEnd type="arrow"/>
           </a:ln>
         </p:spPr>
@@ -5514,7 +5514,7 @@
           <a:prstGeom prst="straightConnector1">
             <a:avLst/>
           </a:prstGeom>
-          <a:ln>
+          <a:ln w="25400">
             <a:tailEnd type="arrow"/>
           </a:ln>
         </p:spPr>
@@ -5556,12 +5556,8 @@
           <a:lstStyle/>
           <a:p>
             <a:r>
-              <a:rPr lang="en-US" sz="2400" dirty="0" err="1"/>
-              <a:t>Ethereum</a:t>
-            </a:r>
-            <a:r>
               <a:rPr lang="en-US" sz="2400" dirty="0"/>
-              <a:t>/RSK</a:t>
+              <a:t>Ethereum/RSK</a:t>
             </a:r>
           </a:p>
         </p:txBody>
@@ -5612,7 +5608,7 @@
           <a:prstGeom prst="straightConnector1">
             <a:avLst/>
           </a:prstGeom>
-          <a:ln>
+          <a:ln w="25400">
             <a:prstDash val="dash"/>
             <a:tailEnd type="arrow"/>
           </a:ln>
@@ -5749,7 +5745,7 @@
           <a:prstGeom prst="straightConnector1">
             <a:avLst/>
           </a:prstGeom>
-          <a:ln>
+          <a:ln w="25400">
             <a:tailEnd type="arrow"/>
           </a:ln>
         </p:spPr>
@@ -5784,7 +5780,7 @@
           <a:prstGeom prst="straightConnector1">
             <a:avLst/>
           </a:prstGeom>
-          <a:ln>
+          <a:ln w="25400">
             <a:tailEnd type="arrow"/>
           </a:ln>
         </p:spPr>
@@ -5817,7 +5813,7 @@
           <a:prstGeom prst="straightConnector1">
             <a:avLst/>
           </a:prstGeom>
-          <a:ln>
+          <a:ln w="25400">
             <a:prstDash val="dash"/>
             <a:tailEnd type="arrow"/>
           </a:ln>
@@ -9747,28 +9743,6 @@
           <a:chExt cx="0" cy="0"/>
         </a:xfrm>
       </p:grpSpPr>
-      <p:sp>
-        <p:nvSpPr>
-          <p:cNvPr id="4" name="Title 3"/>
-          <p:cNvSpPr>
-            <a:spLocks noGrp="1"/>
-          </p:cNvSpPr>
-          <p:nvPr>
-            <p:ph type="title"/>
-          </p:nvPr>
-        </p:nvSpPr>
-        <p:spPr/>
-        <p:txBody>
-          <a:bodyPr/>
-          <a:lstStyle/>
-          <a:p>
-            <a:r>
-              <a:rPr lang="en-US" dirty="0"/>
-              <a:t>Mining</a:t>
-            </a:r>
-          </a:p>
-        </p:txBody>
-      </p:sp>
       <p:sp>
         <p:nvSpPr>
           <p:cNvPr id="5" name="Oval 4"/>

</xml_diff>

<commit_message>
From Eth/RSK to Bitcoin
</commit_message>
<xml_diff>
--- a/ConnBlockchains/images/BlockchainImages.pptx
+++ b/ConnBlockchains/images/BlockchainImages.pptx
@@ -17,6 +17,7 @@
     <p:sldId id="269" r:id="rId11"/>
     <p:sldId id="271" r:id="rId12"/>
     <p:sldId id="272" r:id="rId13"/>
+    <p:sldId id="273" r:id="rId14"/>
   </p:sldIdLst>
   <p:sldSz cx="12192000" cy="6858000"/>
   <p:notesSz cx="6858000" cy="9144000"/>
@@ -5004,6 +5005,928 @@
     <p:extLst>
       <p:ext uri="{BB962C8B-B14F-4D97-AF65-F5344CB8AC3E}">
         <p14:creationId xmlns:p14="http://schemas.microsoft.com/office/powerpoint/2010/main" val="3226221520"/>
+      </p:ext>
+    </p:extLst>
+  </p:cSld>
+  <p:clrMapOvr>
+    <a:masterClrMapping/>
+  </p:clrMapOvr>
+</p:sld>
+</file>
+
+<file path=ppt/slides/slide13.xml><?xml version="1.0" encoding="utf-8"?>
+<p:sld xmlns:a="http://schemas.openxmlformats.org/drawingml/2006/main" xmlns:r="http://schemas.openxmlformats.org/officeDocument/2006/relationships" xmlns:p="http://schemas.openxmlformats.org/presentationml/2006/main">
+  <p:cSld>
+    <p:spTree>
+      <p:nvGrpSpPr>
+        <p:cNvPr id="1" name=""/>
+        <p:cNvGrpSpPr/>
+        <p:nvPr/>
+      </p:nvGrpSpPr>
+      <p:grpSpPr>
+        <a:xfrm>
+          <a:off x="0" y="0"/>
+          <a:ext cx="0" cy="0"/>
+          <a:chOff x="0" y="0"/>
+          <a:chExt cx="0" cy="0"/>
+        </a:xfrm>
+      </p:grpSpPr>
+      <p:sp>
+        <p:nvSpPr>
+          <p:cNvPr id="21" name="Rectangle 20"/>
+          <p:cNvSpPr/>
+          <p:nvPr/>
+        </p:nvSpPr>
+        <p:spPr>
+          <a:xfrm>
+            <a:off x="6287728" y="982869"/>
+            <a:ext cx="5624872" cy="1963531"/>
+          </a:xfrm>
+          <a:prstGeom prst="rect">
+            <a:avLst/>
+          </a:prstGeom>
+          <a:solidFill>
+            <a:schemeClr val="accent1">
+              <a:lumMod val="20000"/>
+              <a:lumOff val="80000"/>
+            </a:schemeClr>
+          </a:solidFill>
+        </p:spPr>
+        <p:style>
+          <a:lnRef idx="2">
+            <a:schemeClr val="accent1">
+              <a:shade val="50000"/>
+            </a:schemeClr>
+          </a:lnRef>
+          <a:fillRef idx="1">
+            <a:schemeClr val="accent1"/>
+          </a:fillRef>
+          <a:effectRef idx="0">
+            <a:schemeClr val="accent1"/>
+          </a:effectRef>
+          <a:fontRef idx="minor">
+            <a:schemeClr val="lt1"/>
+          </a:fontRef>
+        </p:style>
+        <p:txBody>
+          <a:bodyPr rtlCol="0" anchor="ctr"/>
+          <a:lstStyle/>
+          <a:p>
+            <a:pPr algn="ctr"/>
+            <a:endParaRPr lang="es-ES"/>
+          </a:p>
+        </p:txBody>
+      </p:sp>
+      <p:sp>
+        <p:nvSpPr>
+          <p:cNvPr id="10" name="9 Rectángulo"/>
+          <p:cNvSpPr/>
+          <p:nvPr/>
+        </p:nvSpPr>
+        <p:spPr>
+          <a:xfrm>
+            <a:off x="589936" y="4222956"/>
+            <a:ext cx="6232895" cy="1533833"/>
+          </a:xfrm>
+          <a:prstGeom prst="rect">
+            <a:avLst/>
+          </a:prstGeom>
+        </p:spPr>
+        <p:style>
+          <a:lnRef idx="2">
+            <a:schemeClr val="accent4">
+              <a:shade val="50000"/>
+            </a:schemeClr>
+          </a:lnRef>
+          <a:fillRef idx="1">
+            <a:schemeClr val="accent4"/>
+          </a:fillRef>
+          <a:effectRef idx="0">
+            <a:schemeClr val="accent4"/>
+          </a:effectRef>
+          <a:fontRef idx="minor">
+            <a:schemeClr val="lt1"/>
+          </a:fontRef>
+        </p:style>
+        <p:txBody>
+          <a:bodyPr rtlCol="0" anchor="ctr"/>
+          <a:lstStyle/>
+          <a:p>
+            <a:pPr algn="ctr"/>
+            <a:endParaRPr lang="en-US" dirty="0"/>
+          </a:p>
+        </p:txBody>
+      </p:sp>
+      <p:sp>
+        <p:nvSpPr>
+          <p:cNvPr id="11" name="10 Rectángulo"/>
+          <p:cNvSpPr/>
+          <p:nvPr/>
+        </p:nvSpPr>
+        <p:spPr>
+          <a:xfrm>
+            <a:off x="4694903" y="4606414"/>
+            <a:ext cx="1799303" cy="796413"/>
+          </a:xfrm>
+          <a:prstGeom prst="rect">
+            <a:avLst/>
+          </a:prstGeom>
+          <a:solidFill>
+            <a:srgbClr val="FD4133"/>
+          </a:solidFill>
+        </p:spPr>
+        <p:style>
+          <a:lnRef idx="2">
+            <a:schemeClr val="accent1">
+              <a:shade val="50000"/>
+            </a:schemeClr>
+          </a:lnRef>
+          <a:fillRef idx="1">
+            <a:schemeClr val="accent1"/>
+          </a:fillRef>
+          <a:effectRef idx="0">
+            <a:schemeClr val="accent1"/>
+          </a:effectRef>
+          <a:fontRef idx="minor">
+            <a:schemeClr val="lt1"/>
+          </a:fontRef>
+        </p:style>
+        <p:txBody>
+          <a:bodyPr rtlCol="0" anchor="ctr"/>
+          <a:lstStyle/>
+          <a:p>
+            <a:pPr algn="ctr"/>
+            <a:r>
+              <a:rPr lang="en-US" sz="2800" dirty="0">
+                <a:solidFill>
+                  <a:schemeClr val="tx1"/>
+                </a:solidFill>
+              </a:rPr>
+              <a:t>Bridge Contract</a:t>
+            </a:r>
+          </a:p>
+        </p:txBody>
+      </p:sp>
+      <p:sp>
+        <p:nvSpPr>
+          <p:cNvPr id="18" name="11 Rectángulo"/>
+          <p:cNvSpPr/>
+          <p:nvPr/>
+        </p:nvSpPr>
+        <p:spPr>
+          <a:xfrm>
+            <a:off x="1076631" y="4547659"/>
+            <a:ext cx="1799303" cy="796413"/>
+          </a:xfrm>
+          <a:prstGeom prst="rect">
+            <a:avLst/>
+          </a:prstGeom>
+          <a:solidFill>
+            <a:srgbClr val="FD4133"/>
+          </a:solidFill>
+        </p:spPr>
+        <p:style>
+          <a:lnRef idx="2">
+            <a:schemeClr val="accent1">
+              <a:shade val="50000"/>
+            </a:schemeClr>
+          </a:lnRef>
+          <a:fillRef idx="1">
+            <a:schemeClr val="accent1"/>
+          </a:fillRef>
+          <a:effectRef idx="0">
+            <a:schemeClr val="accent1"/>
+          </a:effectRef>
+          <a:fontRef idx="minor">
+            <a:schemeClr val="lt1"/>
+          </a:fontRef>
+        </p:style>
+        <p:txBody>
+          <a:bodyPr rtlCol="0" anchor="ctr"/>
+          <a:lstStyle/>
+          <a:p>
+            <a:pPr algn="ctr"/>
+            <a:r>
+              <a:rPr lang="en-US" sz="2800" dirty="0">
+                <a:solidFill>
+                  <a:schemeClr val="tx1"/>
+                </a:solidFill>
+              </a:rPr>
+              <a:t>Acc2’</a:t>
+            </a:r>
+          </a:p>
+        </p:txBody>
+      </p:sp>
+      <p:cxnSp>
+        <p:nvCxnSpPr>
+          <p:cNvPr id="20" name="5 Conector recto de flecha"/>
+          <p:cNvCxnSpPr>
+            <a:endCxn id="11" idx="1"/>
+          </p:cNvCxnSpPr>
+          <p:nvPr/>
+        </p:nvCxnSpPr>
+        <p:spPr>
+          <a:xfrm>
+            <a:off x="2875934" y="4984957"/>
+            <a:ext cx="1818969" cy="19664"/>
+          </a:xfrm>
+          <a:prstGeom prst="straightConnector1">
+            <a:avLst/>
+          </a:prstGeom>
+          <a:ln w="25400">
+            <a:tailEnd type="arrow"/>
+          </a:ln>
+        </p:spPr>
+        <p:style>
+          <a:lnRef idx="1">
+            <a:schemeClr val="accent1"/>
+          </a:lnRef>
+          <a:fillRef idx="0">
+            <a:schemeClr val="accent1"/>
+          </a:fillRef>
+          <a:effectRef idx="0">
+            <a:schemeClr val="accent1"/>
+          </a:effectRef>
+          <a:fontRef idx="minor">
+            <a:schemeClr val="tx1"/>
+          </a:fontRef>
+        </p:style>
+      </p:cxnSp>
+      <p:cxnSp>
+        <p:nvCxnSpPr>
+          <p:cNvPr id="22" name="16 Conector recto de flecha"/>
+          <p:cNvCxnSpPr>
+            <a:stCxn id="11" idx="0"/>
+          </p:cNvCxnSpPr>
+          <p:nvPr/>
+        </p:nvCxnSpPr>
+        <p:spPr>
+          <a:xfrm flipV="1">
+            <a:off x="5594555" y="2946400"/>
+            <a:ext cx="1386346" cy="1660014"/>
+          </a:xfrm>
+          <a:prstGeom prst="straightConnector1">
+            <a:avLst/>
+          </a:prstGeom>
+          <a:ln w="25400">
+            <a:prstDash val="dash"/>
+            <a:tailEnd type="arrow"/>
+          </a:ln>
+        </p:spPr>
+        <p:style>
+          <a:lnRef idx="1">
+            <a:schemeClr val="accent1"/>
+          </a:lnRef>
+          <a:fillRef idx="0">
+            <a:schemeClr val="accent1"/>
+          </a:fillRef>
+          <a:effectRef idx="0">
+            <a:schemeClr val="accent1"/>
+          </a:effectRef>
+          <a:fontRef idx="minor">
+            <a:schemeClr val="tx1"/>
+          </a:fontRef>
+        </p:style>
+      </p:cxnSp>
+      <p:sp>
+        <p:nvSpPr>
+          <p:cNvPr id="26" name="14 CuadroTexto"/>
+          <p:cNvSpPr txBox="1"/>
+          <p:nvPr/>
+        </p:nvSpPr>
+        <p:spPr>
+          <a:xfrm>
+            <a:off x="3481785" y="4481400"/>
+            <a:ext cx="499111" cy="523220"/>
+          </a:xfrm>
+          <a:prstGeom prst="rect">
+            <a:avLst/>
+          </a:prstGeom>
+          <a:noFill/>
+        </p:spPr>
+        <p:txBody>
+          <a:bodyPr wrap="none" rtlCol="0">
+            <a:spAutoFit/>
+          </a:bodyPr>
+          <a:lstStyle/>
+          <a:p>
+            <a:r>
+              <a:rPr lang="en-US" sz="2800" dirty="0"/>
+              <a:t>Tx</a:t>
+            </a:r>
+          </a:p>
+        </p:txBody>
+      </p:sp>
+      <p:sp>
+        <p:nvSpPr>
+          <p:cNvPr id="23" name="13 CuadroTexto"/>
+          <p:cNvSpPr txBox="1"/>
+          <p:nvPr/>
+        </p:nvSpPr>
+        <p:spPr>
+          <a:xfrm>
+            <a:off x="588038" y="3692810"/>
+            <a:ext cx="1997213" cy="461665"/>
+          </a:xfrm>
+          <a:prstGeom prst="rect">
+            <a:avLst/>
+          </a:prstGeom>
+          <a:noFill/>
+        </p:spPr>
+        <p:txBody>
+          <a:bodyPr wrap="none" rtlCol="0">
+            <a:spAutoFit/>
+          </a:bodyPr>
+          <a:lstStyle/>
+          <a:p>
+            <a:r>
+              <a:rPr lang="en-US" sz="2400" dirty="0"/>
+              <a:t>Ethereum/RSK</a:t>
+            </a:r>
+          </a:p>
+        </p:txBody>
+      </p:sp>
+      <p:sp>
+        <p:nvSpPr>
+          <p:cNvPr id="24" name="Rectangle 23"/>
+          <p:cNvSpPr/>
+          <p:nvPr/>
+        </p:nvSpPr>
+        <p:spPr>
+          <a:xfrm>
+            <a:off x="6815516" y="1485039"/>
+            <a:ext cx="1692809" cy="375210"/>
+          </a:xfrm>
+          <a:prstGeom prst="rect">
+            <a:avLst/>
+          </a:prstGeom>
+        </p:spPr>
+        <p:style>
+          <a:lnRef idx="2">
+            <a:schemeClr val="accent1">
+              <a:shade val="50000"/>
+            </a:schemeClr>
+          </a:lnRef>
+          <a:fillRef idx="1">
+            <a:schemeClr val="accent1"/>
+          </a:fillRef>
+          <a:effectRef idx="0">
+            <a:schemeClr val="accent1"/>
+          </a:effectRef>
+          <a:fontRef idx="minor">
+            <a:schemeClr val="lt1"/>
+          </a:fontRef>
+        </p:style>
+        <p:txBody>
+          <a:bodyPr rtlCol="0" anchor="ctr"/>
+          <a:lstStyle/>
+          <a:p>
+            <a:pPr algn="ctr"/>
+            <a:endParaRPr lang="es-ES"/>
+          </a:p>
+        </p:txBody>
+      </p:sp>
+      <p:sp>
+        <p:nvSpPr>
+          <p:cNvPr id="27" name="Rectangle 26"/>
+          <p:cNvSpPr/>
+          <p:nvPr/>
+        </p:nvSpPr>
+        <p:spPr>
+          <a:xfrm>
+            <a:off x="8521282" y="1474213"/>
+            <a:ext cx="641348" cy="375210"/>
+          </a:xfrm>
+          <a:prstGeom prst="rect">
+            <a:avLst/>
+          </a:prstGeom>
+          <a:solidFill>
+            <a:srgbClr val="00B0F0"/>
+          </a:solidFill>
+        </p:spPr>
+        <p:style>
+          <a:lnRef idx="2">
+            <a:schemeClr val="accent1">
+              <a:shade val="50000"/>
+            </a:schemeClr>
+          </a:lnRef>
+          <a:fillRef idx="1">
+            <a:schemeClr val="accent1"/>
+          </a:fillRef>
+          <a:effectRef idx="0">
+            <a:schemeClr val="accent1"/>
+          </a:effectRef>
+          <a:fontRef idx="minor">
+            <a:schemeClr val="lt1"/>
+          </a:fontRef>
+        </p:style>
+        <p:txBody>
+          <a:bodyPr rtlCol="0" anchor="ctr"/>
+          <a:lstStyle/>
+          <a:p>
+            <a:pPr algn="ctr"/>
+            <a:r>
+              <a:rPr lang="es-MX" dirty="0">
+                <a:solidFill>
+                  <a:schemeClr val="tx1"/>
+                </a:solidFill>
+              </a:rPr>
+              <a:t>0.05</a:t>
+            </a:r>
+            <a:endParaRPr lang="es-ES" dirty="0">
+              <a:solidFill>
+                <a:schemeClr val="tx1"/>
+              </a:solidFill>
+            </a:endParaRPr>
+          </a:p>
+        </p:txBody>
+      </p:sp>
+      <p:sp>
+        <p:nvSpPr>
+          <p:cNvPr id="28" name="Rectangle 27"/>
+          <p:cNvSpPr/>
+          <p:nvPr/>
+        </p:nvSpPr>
+        <p:spPr>
+          <a:xfrm>
+            <a:off x="6815516" y="1857932"/>
+            <a:ext cx="1692809" cy="375210"/>
+          </a:xfrm>
+          <a:prstGeom prst="rect">
+            <a:avLst/>
+          </a:prstGeom>
+        </p:spPr>
+        <p:style>
+          <a:lnRef idx="2">
+            <a:schemeClr val="accent1">
+              <a:shade val="50000"/>
+            </a:schemeClr>
+          </a:lnRef>
+          <a:fillRef idx="1">
+            <a:schemeClr val="accent1"/>
+          </a:fillRef>
+          <a:effectRef idx="0">
+            <a:schemeClr val="accent1"/>
+          </a:effectRef>
+          <a:fontRef idx="minor">
+            <a:schemeClr val="lt1"/>
+          </a:fontRef>
+        </p:style>
+        <p:txBody>
+          <a:bodyPr rtlCol="0" anchor="ctr"/>
+          <a:lstStyle/>
+          <a:p>
+            <a:pPr algn="ctr"/>
+            <a:endParaRPr lang="es-ES"/>
+          </a:p>
+        </p:txBody>
+      </p:sp>
+      <p:sp>
+        <p:nvSpPr>
+          <p:cNvPr id="29" name="Rectangle 28"/>
+          <p:cNvSpPr/>
+          <p:nvPr/>
+        </p:nvSpPr>
+        <p:spPr>
+          <a:xfrm>
+            <a:off x="8515610" y="1857932"/>
+            <a:ext cx="641348" cy="375210"/>
+          </a:xfrm>
+          <a:prstGeom prst="rect">
+            <a:avLst/>
+          </a:prstGeom>
+          <a:solidFill>
+            <a:srgbClr val="00B0F0"/>
+          </a:solidFill>
+        </p:spPr>
+        <p:style>
+          <a:lnRef idx="2">
+            <a:schemeClr val="accent1">
+              <a:shade val="50000"/>
+            </a:schemeClr>
+          </a:lnRef>
+          <a:fillRef idx="1">
+            <a:schemeClr val="accent1"/>
+          </a:fillRef>
+          <a:effectRef idx="0">
+            <a:schemeClr val="accent1"/>
+          </a:effectRef>
+          <a:fontRef idx="minor">
+            <a:schemeClr val="lt1"/>
+          </a:fontRef>
+        </p:style>
+        <p:txBody>
+          <a:bodyPr rtlCol="0" anchor="ctr"/>
+          <a:lstStyle/>
+          <a:p>
+            <a:pPr algn="ctr"/>
+            <a:r>
+              <a:rPr lang="es-MX" dirty="0">
+                <a:solidFill>
+                  <a:schemeClr val="tx1"/>
+                </a:solidFill>
+              </a:rPr>
+              <a:t>0.15</a:t>
+            </a:r>
+            <a:endParaRPr lang="es-ES" dirty="0">
+              <a:solidFill>
+                <a:schemeClr val="tx1"/>
+              </a:solidFill>
+            </a:endParaRPr>
+          </a:p>
+        </p:txBody>
+      </p:sp>
+      <p:sp>
+        <p:nvSpPr>
+          <p:cNvPr id="30" name="Rectangle 29"/>
+          <p:cNvSpPr/>
+          <p:nvPr/>
+        </p:nvSpPr>
+        <p:spPr>
+          <a:xfrm>
+            <a:off x="6815516" y="2244894"/>
+            <a:ext cx="1692809" cy="375210"/>
+          </a:xfrm>
+          <a:prstGeom prst="rect">
+            <a:avLst/>
+          </a:prstGeom>
+        </p:spPr>
+        <p:style>
+          <a:lnRef idx="2">
+            <a:schemeClr val="accent1">
+              <a:shade val="50000"/>
+            </a:schemeClr>
+          </a:lnRef>
+          <a:fillRef idx="1">
+            <a:schemeClr val="accent1"/>
+          </a:fillRef>
+          <a:effectRef idx="0">
+            <a:schemeClr val="accent1"/>
+          </a:effectRef>
+          <a:fontRef idx="minor">
+            <a:schemeClr val="lt1"/>
+          </a:fontRef>
+        </p:style>
+        <p:txBody>
+          <a:bodyPr rtlCol="0" anchor="ctr"/>
+          <a:lstStyle/>
+          <a:p>
+            <a:pPr algn="ctr"/>
+            <a:endParaRPr lang="es-ES"/>
+          </a:p>
+        </p:txBody>
+      </p:sp>
+      <p:sp>
+        <p:nvSpPr>
+          <p:cNvPr id="31" name="Rectangle 30"/>
+          <p:cNvSpPr/>
+          <p:nvPr/>
+        </p:nvSpPr>
+        <p:spPr>
+          <a:xfrm>
+            <a:off x="8515607" y="2244894"/>
+            <a:ext cx="641348" cy="375210"/>
+          </a:xfrm>
+          <a:prstGeom prst="rect">
+            <a:avLst/>
+          </a:prstGeom>
+          <a:solidFill>
+            <a:srgbClr val="00B0F0"/>
+          </a:solidFill>
+        </p:spPr>
+        <p:style>
+          <a:lnRef idx="2">
+            <a:schemeClr val="accent1">
+              <a:shade val="50000"/>
+            </a:schemeClr>
+          </a:lnRef>
+          <a:fillRef idx="1">
+            <a:schemeClr val="accent1"/>
+          </a:fillRef>
+          <a:effectRef idx="0">
+            <a:schemeClr val="accent1"/>
+          </a:effectRef>
+          <a:fontRef idx="minor">
+            <a:schemeClr val="lt1"/>
+          </a:fontRef>
+        </p:style>
+        <p:txBody>
+          <a:bodyPr rtlCol="0" anchor="ctr"/>
+          <a:lstStyle/>
+          <a:p>
+            <a:pPr algn="ctr"/>
+            <a:r>
+              <a:rPr lang="es-MX" dirty="0">
+                <a:solidFill>
+                  <a:schemeClr val="tx1"/>
+                </a:solidFill>
+              </a:rPr>
+              <a:t>0.25</a:t>
+            </a:r>
+            <a:endParaRPr lang="es-ES" dirty="0">
+              <a:solidFill>
+                <a:schemeClr val="tx1"/>
+              </a:solidFill>
+            </a:endParaRPr>
+          </a:p>
+        </p:txBody>
+      </p:sp>
+      <p:sp>
+        <p:nvSpPr>
+          <p:cNvPr id="32" name="TextBox 31"/>
+          <p:cNvSpPr txBox="1"/>
+          <p:nvPr/>
+        </p:nvSpPr>
+        <p:spPr>
+          <a:xfrm>
+            <a:off x="6815515" y="985130"/>
+            <a:ext cx="1214919" cy="523220"/>
+          </a:xfrm>
+          <a:prstGeom prst="rect">
+            <a:avLst/>
+          </a:prstGeom>
+          <a:noFill/>
+        </p:spPr>
+        <p:txBody>
+          <a:bodyPr wrap="square" rtlCol="0">
+            <a:spAutoFit/>
+          </a:bodyPr>
+          <a:lstStyle/>
+          <a:p>
+            <a:r>
+              <a:rPr lang="es-MX" sz="2800" dirty="0"/>
+              <a:t>Inputs</a:t>
+            </a:r>
+            <a:endParaRPr lang="es-ES" dirty="0"/>
+          </a:p>
+        </p:txBody>
+      </p:sp>
+      <p:sp>
+        <p:nvSpPr>
+          <p:cNvPr id="33" name="Rectangle 32"/>
+          <p:cNvSpPr/>
+          <p:nvPr/>
+        </p:nvSpPr>
+        <p:spPr>
+          <a:xfrm>
+            <a:off x="9252226" y="1485039"/>
+            <a:ext cx="1692809" cy="375210"/>
+          </a:xfrm>
+          <a:prstGeom prst="rect">
+            <a:avLst/>
+          </a:prstGeom>
+          <a:solidFill>
+            <a:schemeClr val="accent6"/>
+          </a:solidFill>
+        </p:spPr>
+        <p:style>
+          <a:lnRef idx="2">
+            <a:schemeClr val="accent1">
+              <a:shade val="50000"/>
+            </a:schemeClr>
+          </a:lnRef>
+          <a:fillRef idx="1">
+            <a:schemeClr val="accent1"/>
+          </a:fillRef>
+          <a:effectRef idx="0">
+            <a:schemeClr val="accent1"/>
+          </a:effectRef>
+          <a:fontRef idx="minor">
+            <a:schemeClr val="lt1"/>
+          </a:fontRef>
+        </p:style>
+        <p:txBody>
+          <a:bodyPr rtlCol="0" anchor="ctr"/>
+          <a:lstStyle/>
+          <a:p>
+            <a:pPr algn="ctr"/>
+            <a:endParaRPr lang="es-ES"/>
+          </a:p>
+        </p:txBody>
+      </p:sp>
+      <p:sp>
+        <p:nvSpPr>
+          <p:cNvPr id="34" name="Rectangle 33"/>
+          <p:cNvSpPr/>
+          <p:nvPr/>
+        </p:nvSpPr>
+        <p:spPr>
+          <a:xfrm>
+            <a:off x="10950950" y="1485039"/>
+            <a:ext cx="641348" cy="375210"/>
+          </a:xfrm>
+          <a:prstGeom prst="rect">
+            <a:avLst/>
+          </a:prstGeom>
+          <a:solidFill>
+            <a:schemeClr val="accent6">
+              <a:lumMod val="60000"/>
+              <a:lumOff val="40000"/>
+            </a:schemeClr>
+          </a:solidFill>
+        </p:spPr>
+        <p:style>
+          <a:lnRef idx="2">
+            <a:schemeClr val="accent1">
+              <a:shade val="50000"/>
+            </a:schemeClr>
+          </a:lnRef>
+          <a:fillRef idx="1">
+            <a:schemeClr val="accent1"/>
+          </a:fillRef>
+          <a:effectRef idx="0">
+            <a:schemeClr val="accent1"/>
+          </a:effectRef>
+          <a:fontRef idx="minor">
+            <a:schemeClr val="lt1"/>
+          </a:fontRef>
+        </p:style>
+        <p:txBody>
+          <a:bodyPr rtlCol="0" anchor="ctr"/>
+          <a:lstStyle/>
+          <a:p>
+            <a:pPr algn="ctr"/>
+            <a:r>
+              <a:rPr lang="es-MX" dirty="0">
+                <a:solidFill>
+                  <a:schemeClr val="tx1"/>
+                </a:solidFill>
+              </a:rPr>
+              <a:t>0.38</a:t>
+            </a:r>
+            <a:endParaRPr lang="es-ES" dirty="0">
+              <a:solidFill>
+                <a:schemeClr val="tx1"/>
+              </a:solidFill>
+            </a:endParaRPr>
+          </a:p>
+        </p:txBody>
+      </p:sp>
+      <p:sp>
+        <p:nvSpPr>
+          <p:cNvPr id="35" name="Rectangle 34"/>
+          <p:cNvSpPr/>
+          <p:nvPr/>
+        </p:nvSpPr>
+        <p:spPr>
+          <a:xfrm>
+            <a:off x="9245600" y="1864557"/>
+            <a:ext cx="1692809" cy="375210"/>
+          </a:xfrm>
+          <a:prstGeom prst="rect">
+            <a:avLst/>
+          </a:prstGeom>
+          <a:solidFill>
+            <a:schemeClr val="accent6"/>
+          </a:solidFill>
+        </p:spPr>
+        <p:style>
+          <a:lnRef idx="2">
+            <a:schemeClr val="accent1">
+              <a:shade val="50000"/>
+            </a:schemeClr>
+          </a:lnRef>
+          <a:fillRef idx="1">
+            <a:schemeClr val="accent1"/>
+          </a:fillRef>
+          <a:effectRef idx="0">
+            <a:schemeClr val="accent1"/>
+          </a:effectRef>
+          <a:fontRef idx="minor">
+            <a:schemeClr val="lt1"/>
+          </a:fontRef>
+        </p:style>
+        <p:txBody>
+          <a:bodyPr rtlCol="0" anchor="ctr"/>
+          <a:lstStyle/>
+          <a:p>
+            <a:pPr algn="ctr"/>
+            <a:endParaRPr lang="es-ES"/>
+          </a:p>
+        </p:txBody>
+      </p:sp>
+      <p:sp>
+        <p:nvSpPr>
+          <p:cNvPr id="36" name="Rectangle 35"/>
+          <p:cNvSpPr/>
+          <p:nvPr/>
+        </p:nvSpPr>
+        <p:spPr>
+          <a:xfrm>
+            <a:off x="10944324" y="1864557"/>
+            <a:ext cx="641348" cy="375210"/>
+          </a:xfrm>
+          <a:prstGeom prst="rect">
+            <a:avLst/>
+          </a:prstGeom>
+          <a:solidFill>
+            <a:schemeClr val="accent6">
+              <a:lumMod val="60000"/>
+              <a:lumOff val="40000"/>
+            </a:schemeClr>
+          </a:solidFill>
+        </p:spPr>
+        <p:style>
+          <a:lnRef idx="2">
+            <a:schemeClr val="accent1">
+              <a:shade val="50000"/>
+            </a:schemeClr>
+          </a:lnRef>
+          <a:fillRef idx="1">
+            <a:schemeClr val="accent1"/>
+          </a:fillRef>
+          <a:effectRef idx="0">
+            <a:schemeClr val="accent1"/>
+          </a:effectRef>
+          <a:fontRef idx="minor">
+            <a:schemeClr val="lt1"/>
+          </a:fontRef>
+        </p:style>
+        <p:txBody>
+          <a:bodyPr rtlCol="0" anchor="ctr"/>
+          <a:lstStyle/>
+          <a:p>
+            <a:pPr algn="ctr"/>
+            <a:r>
+              <a:rPr lang="es-MX" dirty="0">
+                <a:solidFill>
+                  <a:schemeClr val="tx1"/>
+                </a:solidFill>
+              </a:rPr>
+              <a:t>0.02</a:t>
+            </a:r>
+            <a:endParaRPr lang="es-ES" dirty="0">
+              <a:solidFill>
+                <a:schemeClr val="tx1"/>
+              </a:solidFill>
+            </a:endParaRPr>
+          </a:p>
+        </p:txBody>
+      </p:sp>
+      <p:sp>
+        <p:nvSpPr>
+          <p:cNvPr id="37" name="TextBox 36"/>
+          <p:cNvSpPr txBox="1"/>
+          <p:nvPr/>
+        </p:nvSpPr>
+        <p:spPr>
+          <a:xfrm>
+            <a:off x="9252226" y="982869"/>
+            <a:ext cx="1432207" cy="523220"/>
+          </a:xfrm>
+          <a:prstGeom prst="rect">
+            <a:avLst/>
+          </a:prstGeom>
+          <a:noFill/>
+        </p:spPr>
+        <p:txBody>
+          <a:bodyPr wrap="square" rtlCol="0">
+            <a:spAutoFit/>
+          </a:bodyPr>
+          <a:lstStyle/>
+          <a:p>
+            <a:r>
+              <a:rPr lang="es-MX" sz="2800" dirty="0"/>
+              <a:t>Outputs</a:t>
+            </a:r>
+            <a:endParaRPr lang="es-ES" dirty="0"/>
+          </a:p>
+        </p:txBody>
+      </p:sp>
+      <p:sp>
+        <p:nvSpPr>
+          <p:cNvPr id="38" name="TextBox 37"/>
+          <p:cNvSpPr txBox="1"/>
+          <p:nvPr/>
+        </p:nvSpPr>
+        <p:spPr>
+          <a:xfrm>
+            <a:off x="6287728" y="547118"/>
+            <a:ext cx="2547813" cy="461665"/>
+          </a:xfrm>
+          <a:prstGeom prst="rect">
+            <a:avLst/>
+          </a:prstGeom>
+          <a:noFill/>
+        </p:spPr>
+        <p:txBody>
+          <a:bodyPr wrap="none" rtlCol="0">
+            <a:spAutoFit/>
+          </a:bodyPr>
+          <a:lstStyle/>
+          <a:p>
+            <a:r>
+              <a:rPr lang="es-MX" sz="2400" dirty="0"/>
+              <a:t>Bitcoin Transaction</a:t>
+            </a:r>
+            <a:endParaRPr lang="es-ES" sz="2400" dirty="0"/>
+          </a:p>
+        </p:txBody>
+      </p:sp>
+    </p:spTree>
+    <p:extLst>
+      <p:ext uri="{BB962C8B-B14F-4D97-AF65-F5344CB8AC3E}">
+        <p14:creationId xmlns:p14="http://schemas.microsoft.com/office/powerpoint/2010/main" val="4009505220"/>
       </p:ext>
     </p:extLst>
   </p:cSld>

</xml_diff>